<commit_message>
Added a slide for what we learned from matlab and insight maker fuckery and also added trip to Alpha Centauri slide
</commit_message>
<xml_diff>
--- a/On RTG Design.pptx
+++ b/On RTG Design.pptx
@@ -111,6 +111,11 @@
       </a:defRPr>
     </a:lvl9pPr>
   </p:defaultTextStyle>
+  <p:extLst>
+    <p:ext uri="{EFAFB233-063F-42B5-8137-9DF3F51BA10A}">
+      <p15:sldGuideLst xmlns:p15="http://schemas.microsoft.com/office/powerpoint/2012/main"/>
+    </p:ext>
+  </p:extLst>
 </p:presentation>
 </file>
 
@@ -340,7 +345,7 @@
           <a:p>
             <a:fld id="{8A9F8C75-8048-478D-98CB-F1D016728D0F}" type="datetimeFigureOut">
               <a:rPr lang="en-US" smtClean="0"/>
-              <a:t>11/1/2015</a:t>
+              <a:t>11/3/2015</a:t>
             </a:fld>
             <a:endParaRPr lang="en-US"/>
           </a:p>
@@ -548,7 +553,7 @@
           <a:p>
             <a:fld id="{8A9F8C75-8048-478D-98CB-F1D016728D0F}" type="datetimeFigureOut">
               <a:rPr lang="en-US" smtClean="0"/>
-              <a:t>11/1/2015</a:t>
+              <a:t>11/3/2015</a:t>
             </a:fld>
             <a:endParaRPr lang="en-US"/>
           </a:p>
@@ -804,7 +809,7 @@
           <a:p>
             <a:fld id="{8A9F8C75-8048-478D-98CB-F1D016728D0F}" type="datetimeFigureOut">
               <a:rPr lang="en-US" smtClean="0"/>
-              <a:t>11/1/2015</a:t>
+              <a:t>11/3/2015</a:t>
             </a:fld>
             <a:endParaRPr lang="en-US"/>
           </a:p>
@@ -978,7 +983,7 @@
           <a:p>
             <a:fld id="{8A9F8C75-8048-478D-98CB-F1D016728D0F}" type="datetimeFigureOut">
               <a:rPr lang="en-US" smtClean="0"/>
-              <a:t>11/1/2015</a:t>
+              <a:t>11/3/2015</a:t>
             </a:fld>
             <a:endParaRPr lang="en-US"/>
           </a:p>
@@ -1321,7 +1326,7 @@
           <a:p>
             <a:fld id="{8A9F8C75-8048-478D-98CB-F1D016728D0F}" type="datetimeFigureOut">
               <a:rPr lang="en-US" smtClean="0"/>
-              <a:t>11/1/2015</a:t>
+              <a:t>11/3/2015</a:t>
             </a:fld>
             <a:endParaRPr lang="en-US"/>
           </a:p>
@@ -1596,7 +1601,7 @@
           <a:p>
             <a:fld id="{8A9F8C75-8048-478D-98CB-F1D016728D0F}" type="datetimeFigureOut">
               <a:rPr lang="en-US" smtClean="0"/>
-              <a:t>11/1/2015</a:t>
+              <a:t>11/3/2015</a:t>
             </a:fld>
             <a:endParaRPr lang="en-US"/>
           </a:p>
@@ -1975,7 +1980,7 @@
           <a:p>
             <a:fld id="{8A9F8C75-8048-478D-98CB-F1D016728D0F}" type="datetimeFigureOut">
               <a:rPr lang="en-US" smtClean="0"/>
-              <a:t>11/1/2015</a:t>
+              <a:t>11/3/2015</a:t>
             </a:fld>
             <a:endParaRPr lang="en-US"/>
           </a:p>
@@ -2093,7 +2098,7 @@
           <a:p>
             <a:fld id="{8A9F8C75-8048-478D-98CB-F1D016728D0F}" type="datetimeFigureOut">
               <a:rPr lang="en-US" smtClean="0"/>
-              <a:t>11/1/2015</a:t>
+              <a:t>11/3/2015</a:t>
             </a:fld>
             <a:endParaRPr lang="en-US"/>
           </a:p>
@@ -2264,7 +2269,7 @@
           <a:p>
             <a:fld id="{8A9F8C75-8048-478D-98CB-F1D016728D0F}" type="datetimeFigureOut">
               <a:rPr lang="en-US" smtClean="0"/>
-              <a:t>11/1/2015</a:t>
+              <a:t>11/3/2015</a:t>
             </a:fld>
             <a:endParaRPr lang="en-US"/>
           </a:p>
@@ -2618,7 +2623,7 @@
           <a:p>
             <a:fld id="{8A9F8C75-8048-478D-98CB-F1D016728D0F}" type="datetimeFigureOut">
               <a:rPr lang="en-US" smtClean="0"/>
-              <a:t>11/1/2015</a:t>
+              <a:t>11/3/2015</a:t>
             </a:fld>
             <a:endParaRPr lang="en-US"/>
           </a:p>
@@ -3000,7 +3005,7 @@
           <a:p>
             <a:fld id="{8A9F8C75-8048-478D-98CB-F1D016728D0F}" type="datetimeFigureOut">
               <a:rPr lang="en-US" smtClean="0"/>
-              <a:t>11/1/2015</a:t>
+              <a:t>11/3/2015</a:t>
             </a:fld>
             <a:endParaRPr lang="en-US"/>
           </a:p>
@@ -3287,7 +3292,7 @@
           <a:p>
             <a:fld id="{8A9F8C75-8048-478D-98CB-F1D016728D0F}" type="datetimeFigureOut">
               <a:rPr lang="en-US" smtClean="0"/>
-              <a:t>11/1/2015</a:t>
+              <a:t>11/3/2015</a:t>
             </a:fld>
             <a:endParaRPr lang="en-US"/>
           </a:p>
@@ -4010,7 +4015,6 @@
               <a:rPr lang="en-US" dirty="0"/>
               <a:t>How little plutonium can we use for a given power and mission length?</a:t>
             </a:r>
-            <a:endParaRPr lang="en-US" dirty="0"/>
           </a:p>
         </p:txBody>
       </p:sp>
@@ -4098,6 +4102,1043 @@
           </a:prstGeom>
         </p:spPr>
       </p:pic>
+      <mc:AlternateContent xmlns:mc="http://schemas.openxmlformats.org/markup-compatibility/2006">
+        <mc:Choice xmlns:a14="http://schemas.microsoft.com/office/drawing/2010/main" Requires="a14">
+          <p:sp>
+            <p:nvSpPr>
+              <p:cNvPr id="3" name="Rectangle 2"/>
+              <p:cNvSpPr/>
+              <p:nvPr/>
+            </p:nvSpPr>
+            <p:spPr>
+              <a:xfrm>
+                <a:off x="4958876" y="2679807"/>
+                <a:ext cx="8427308" cy="1562094"/>
+              </a:xfrm>
+              <a:prstGeom prst="rect">
+                <a:avLst/>
+              </a:prstGeom>
+            </p:spPr>
+            <p:txBody>
+              <a:bodyPr wrap="square">
+                <a:spAutoFit/>
+              </a:bodyPr>
+              <a:lstStyle/>
+              <a:p>
+                <a:pPr>
+                  <a:lnSpc>
+                    <a:spcPct val="107000"/>
+                  </a:lnSpc>
+                  <a:spcAft>
+                    <a:spcPts val="800"/>
+                  </a:spcAft>
+                </a:pPr>
+                <a14:m>
+                  <m:oMathPara xmlns:m="http://schemas.openxmlformats.org/officeDocument/2006/math">
+                    <m:oMathParaPr>
+                      <m:jc m:val="centerGroup"/>
+                    </m:oMathParaPr>
+                    <m:oMath xmlns:m="http://schemas.openxmlformats.org/officeDocument/2006/math">
+                      <m:f>
+                        <m:fPr>
+                          <m:ctrlPr>
+                            <a:rPr lang="en-US" i="1" smtClean="0">
+                              <a:effectLst/>
+                              <a:latin typeface="Cambria Math" panose="02040503050406030204" pitchFamily="18" charset="0"/>
+                              <a:ea typeface="STKaiti"/>
+                              <a:cs typeface="Tahoma" panose="020B0604030504040204" pitchFamily="34" charset="0"/>
+                            </a:rPr>
+                          </m:ctrlPr>
+                        </m:fPr>
+                        <m:num>
+                          <m:r>
+                            <a:rPr lang="en-US" i="1">
+                              <a:effectLst/>
+                              <a:latin typeface="Cambria Math" panose="02040503050406030204" pitchFamily="18" charset="0"/>
+                              <a:ea typeface="STKaiti"/>
+                              <a:cs typeface="Tahoma" panose="020B0604030504040204" pitchFamily="34" charset="0"/>
+                            </a:rPr>
+                            <m:t>𝑑𝑄</m:t>
+                          </m:r>
+                        </m:num>
+                        <m:den>
+                          <m:r>
+                            <a:rPr lang="en-US" i="1">
+                              <a:effectLst/>
+                              <a:latin typeface="Cambria Math" panose="02040503050406030204" pitchFamily="18" charset="0"/>
+                              <a:ea typeface="STKaiti"/>
+                              <a:cs typeface="Tahoma" panose="020B0604030504040204" pitchFamily="34" charset="0"/>
+                            </a:rPr>
+                            <m:t>𝑑𝑡</m:t>
+                          </m:r>
+                        </m:den>
+                      </m:f>
+                      <m:r>
+                        <a:rPr lang="en-US" b="0" i="1" smtClean="0">
+                          <a:effectLst/>
+                          <a:latin typeface="Cambria Math" panose="02040503050406030204" pitchFamily="18" charset="0"/>
+                          <a:ea typeface="STKaiti"/>
+                          <a:cs typeface="Tahoma" panose="020B0604030504040204" pitchFamily="34" charset="0"/>
+                        </a:rPr>
+                        <m:t>=</m:t>
+                      </m:r>
+                      <m:f>
+                        <m:fPr>
+                          <m:ctrlPr>
+                            <a:rPr lang="en-US" i="1">
+                              <a:effectLst/>
+                              <a:latin typeface="Cambria Math" panose="02040503050406030204" pitchFamily="18" charset="0"/>
+                              <a:ea typeface="STKaiti"/>
+                              <a:cs typeface="Tahoma" panose="020B0604030504040204" pitchFamily="34" charset="0"/>
+                            </a:rPr>
+                          </m:ctrlPr>
+                        </m:fPr>
+                        <m:num>
+                          <m:r>
+                            <a:rPr lang="en-US" i="1">
+                              <a:effectLst/>
+                              <a:latin typeface="Cambria Math" panose="02040503050406030204" pitchFamily="18" charset="0"/>
+                              <a:ea typeface="STKaiti"/>
+                              <a:cs typeface="Tahoma" panose="020B0604030504040204" pitchFamily="34" charset="0"/>
+                            </a:rPr>
+                            <m:t>𝑑𝐴</m:t>
+                          </m:r>
+                        </m:num>
+                        <m:den>
+                          <m:r>
+                            <a:rPr lang="en-US" i="1">
+                              <a:effectLst/>
+                              <a:latin typeface="Cambria Math" panose="02040503050406030204" pitchFamily="18" charset="0"/>
+                              <a:ea typeface="STKaiti"/>
+                              <a:cs typeface="Tahoma" panose="020B0604030504040204" pitchFamily="34" charset="0"/>
+                            </a:rPr>
+                            <m:t>𝑑𝑡</m:t>
+                          </m:r>
+                        </m:den>
+                      </m:f>
+                      <m:r>
+                        <a:rPr lang="en-US" i="1">
+                          <a:effectLst/>
+                          <a:latin typeface="Cambria Math" panose="02040503050406030204" pitchFamily="18" charset="0"/>
+                          <a:ea typeface="STKaiti"/>
+                          <a:cs typeface="Tahoma" panose="020B0604030504040204" pitchFamily="34" charset="0"/>
+                        </a:rPr>
+                        <m:t>𝑘𝑔</m:t>
+                      </m:r>
+                      <m:r>
+                        <a:rPr lang="en-US" i="1">
+                          <a:effectLst/>
+                          <a:latin typeface="Cambria Math" panose="02040503050406030204" pitchFamily="18" charset="0"/>
+                          <a:ea typeface="STKaiti"/>
+                          <a:cs typeface="Tahoma" panose="020B0604030504040204" pitchFamily="34" charset="0"/>
+                        </a:rPr>
+                        <m:t> </m:t>
+                      </m:r>
+                      <m:r>
+                        <a:rPr lang="en-US" i="1">
+                          <a:effectLst/>
+                          <a:latin typeface="Cambria Math" panose="02040503050406030204" pitchFamily="18" charset="0"/>
+                          <a:ea typeface="STKaiti"/>
+                          <a:cs typeface="Tahoma" panose="020B0604030504040204" pitchFamily="34" charset="0"/>
+                        </a:rPr>
+                        <m:t>𝑦𝑒𝑎𝑟</m:t>
+                      </m:r>
+                      <m:sSup>
+                        <m:sSupPr>
+                          <m:ctrlPr>
+                            <a:rPr lang="en-US" i="1">
+                              <a:effectLst/>
+                              <a:latin typeface="Cambria Math" panose="02040503050406030204" pitchFamily="18" charset="0"/>
+                              <a:ea typeface="STKaiti"/>
+                              <a:cs typeface="Tahoma" panose="020B0604030504040204" pitchFamily="34" charset="0"/>
+                            </a:rPr>
+                          </m:ctrlPr>
+                        </m:sSupPr>
+                        <m:e>
+                          <m:r>
+                            <a:rPr lang="en-US" i="1">
+                              <a:effectLst/>
+                              <a:latin typeface="Cambria Math" panose="02040503050406030204" pitchFamily="18" charset="0"/>
+                              <a:ea typeface="STKaiti"/>
+                              <a:cs typeface="Tahoma" panose="020B0604030504040204" pitchFamily="34" charset="0"/>
+                            </a:rPr>
+                            <m:t>𝑠</m:t>
+                          </m:r>
+                        </m:e>
+                        <m:sup>
+                          <m:r>
+                            <a:rPr lang="en-US" i="1">
+                              <a:effectLst/>
+                              <a:latin typeface="Cambria Math" panose="02040503050406030204" pitchFamily="18" charset="0"/>
+                              <a:ea typeface="STKaiti"/>
+                              <a:cs typeface="Tahoma" panose="020B0604030504040204" pitchFamily="34" charset="0"/>
+                            </a:rPr>
+                            <m:t>−1</m:t>
+                          </m:r>
+                        </m:sup>
+                      </m:sSup>
+                      <m:r>
+                        <a:rPr lang="en-US" i="1">
+                          <a:effectLst/>
+                          <a:latin typeface="Cambria Math" panose="02040503050406030204" pitchFamily="18" charset="0"/>
+                          <a:ea typeface="STKaiti"/>
+                          <a:cs typeface="Tahoma" panose="020B0604030504040204" pitchFamily="34" charset="0"/>
+                        </a:rPr>
+                        <m:t>∗</m:t>
+                      </m:r>
+                      <m:d>
+                        <m:dPr>
+                          <m:ctrlPr>
+                            <a:rPr lang="en-US" i="1">
+                              <a:effectLst/>
+                              <a:latin typeface="Cambria Math" panose="02040503050406030204" pitchFamily="18" charset="0"/>
+                              <a:ea typeface="STKaiti"/>
+                              <a:cs typeface="Tahoma" panose="020B0604030504040204" pitchFamily="34" charset="0"/>
+                            </a:rPr>
+                          </m:ctrlPr>
+                        </m:dPr>
+                        <m:e>
+                          <m:r>
+                            <a:rPr lang="en-US" i="1">
+                              <a:effectLst/>
+                              <a:latin typeface="Cambria Math" panose="02040503050406030204" pitchFamily="18" charset="0"/>
+                              <a:ea typeface="STKaiti"/>
+                              <a:cs typeface="Tahoma" panose="020B0604030504040204" pitchFamily="34" charset="0"/>
+                            </a:rPr>
+                            <m:t>2.53∗</m:t>
+                          </m:r>
+                          <m:sSup>
+                            <m:sSupPr>
+                              <m:ctrlPr>
+                                <a:rPr lang="en-US" i="1">
+                                  <a:effectLst/>
+                                  <a:latin typeface="Cambria Math" panose="02040503050406030204" pitchFamily="18" charset="0"/>
+                                  <a:ea typeface="STKaiti"/>
+                                  <a:cs typeface="Tahoma" panose="020B0604030504040204" pitchFamily="34" charset="0"/>
+                                </a:rPr>
+                              </m:ctrlPr>
+                            </m:sSupPr>
+                            <m:e>
+                              <m:r>
+                                <a:rPr lang="en-US" i="1">
+                                  <a:effectLst/>
+                                  <a:latin typeface="Cambria Math" panose="02040503050406030204" pitchFamily="18" charset="0"/>
+                                  <a:ea typeface="STKaiti"/>
+                                  <a:cs typeface="Tahoma" panose="020B0604030504040204" pitchFamily="34" charset="0"/>
+                                </a:rPr>
+                                <m:t>10</m:t>
+                              </m:r>
+                            </m:e>
+                            <m:sup>
+                              <m:r>
+                                <a:rPr lang="en-US" i="1">
+                                  <a:effectLst/>
+                                  <a:latin typeface="Cambria Math" panose="02040503050406030204" pitchFamily="18" charset="0"/>
+                                  <a:ea typeface="STKaiti"/>
+                                  <a:cs typeface="Tahoma" panose="020B0604030504040204" pitchFamily="34" charset="0"/>
+                                </a:rPr>
+                                <m:t>24</m:t>
+                              </m:r>
+                            </m:sup>
+                          </m:sSup>
+                        </m:e>
+                      </m:d>
+                      <m:r>
+                        <a:rPr lang="en-US" i="1">
+                          <a:effectLst/>
+                          <a:latin typeface="Cambria Math" panose="02040503050406030204" pitchFamily="18" charset="0"/>
+                          <a:ea typeface="STKaiti"/>
+                          <a:cs typeface="Tahoma" panose="020B0604030504040204" pitchFamily="34" charset="0"/>
+                        </a:rPr>
+                        <m:t>𝑎𝑡𝑜𝑚𝑠</m:t>
+                      </m:r>
+                      <m:r>
+                        <a:rPr lang="en-US" i="1">
+                          <a:effectLst/>
+                          <a:latin typeface="Cambria Math" panose="02040503050406030204" pitchFamily="18" charset="0"/>
+                          <a:ea typeface="STKaiti"/>
+                          <a:cs typeface="Tahoma" panose="020B0604030504040204" pitchFamily="34" charset="0"/>
+                        </a:rPr>
+                        <m:t> </m:t>
+                      </m:r>
+                      <m:r>
+                        <a:rPr lang="en-US" i="1">
+                          <a:effectLst/>
+                          <a:latin typeface="Cambria Math" panose="02040503050406030204" pitchFamily="18" charset="0"/>
+                          <a:ea typeface="STKaiti"/>
+                          <a:cs typeface="Tahoma" panose="020B0604030504040204" pitchFamily="34" charset="0"/>
+                        </a:rPr>
+                        <m:t>𝑘</m:t>
+                      </m:r>
+                      <m:sSup>
+                        <m:sSupPr>
+                          <m:ctrlPr>
+                            <a:rPr lang="en-US" i="1">
+                              <a:effectLst/>
+                              <a:latin typeface="Cambria Math" panose="02040503050406030204" pitchFamily="18" charset="0"/>
+                              <a:ea typeface="STKaiti"/>
+                              <a:cs typeface="Tahoma" panose="020B0604030504040204" pitchFamily="34" charset="0"/>
+                            </a:rPr>
+                          </m:ctrlPr>
+                        </m:sSupPr>
+                        <m:e>
+                          <m:r>
+                            <a:rPr lang="en-US" i="1">
+                              <a:effectLst/>
+                              <a:latin typeface="Cambria Math" panose="02040503050406030204" pitchFamily="18" charset="0"/>
+                              <a:ea typeface="STKaiti"/>
+                              <a:cs typeface="Tahoma" panose="020B0604030504040204" pitchFamily="34" charset="0"/>
+                            </a:rPr>
+                            <m:t>𝑔</m:t>
+                          </m:r>
+                        </m:e>
+                        <m:sup>
+                          <m:r>
+                            <a:rPr lang="en-US" i="1">
+                              <a:effectLst/>
+                              <a:latin typeface="Cambria Math" panose="02040503050406030204" pitchFamily="18" charset="0"/>
+                              <a:ea typeface="STKaiti"/>
+                              <a:cs typeface="Tahoma" panose="020B0604030504040204" pitchFamily="34" charset="0"/>
+                            </a:rPr>
+                            <m:t>−1</m:t>
+                          </m:r>
+                        </m:sup>
+                      </m:sSup>
+                    </m:oMath>
+                  </m:oMathPara>
+                </a14:m>
+                <a:endParaRPr lang="en-US" i="1" dirty="0" smtClean="0">
+                  <a:effectLst/>
+                  <a:latin typeface="Cambria Math" panose="02040503050406030204" pitchFamily="18" charset="0"/>
+                  <a:ea typeface="STKaiti"/>
+                  <a:cs typeface="Tahoma" panose="020B0604030504040204" pitchFamily="34" charset="0"/>
+                </a:endParaRPr>
+              </a:p>
+              <a:p>
+                <a:pPr>
+                  <a:lnSpc>
+                    <a:spcPct val="107000"/>
+                  </a:lnSpc>
+                  <a:spcAft>
+                    <a:spcPts val="800"/>
+                  </a:spcAft>
+                </a:pPr>
+                <a14:m>
+                  <m:oMathPara xmlns:m="http://schemas.openxmlformats.org/officeDocument/2006/math">
+                    <m:oMathParaPr>
+                      <m:jc m:val="centerGroup"/>
+                    </m:oMathParaPr>
+                    <m:oMath xmlns:m="http://schemas.openxmlformats.org/officeDocument/2006/math">
+                      <m:r>
+                        <a:rPr lang="en-US" i="1">
+                          <a:effectLst/>
+                          <a:latin typeface="Cambria Math" panose="02040503050406030204" pitchFamily="18" charset="0"/>
+                          <a:ea typeface="STKaiti"/>
+                          <a:cs typeface="Tahoma" panose="020B0604030504040204" pitchFamily="34" charset="0"/>
+                        </a:rPr>
+                        <m:t>∗</m:t>
+                      </m:r>
+                      <m:d>
+                        <m:dPr>
+                          <m:ctrlPr>
+                            <a:rPr lang="en-US" i="1">
+                              <a:effectLst/>
+                              <a:latin typeface="Cambria Math" panose="02040503050406030204" pitchFamily="18" charset="0"/>
+                              <a:ea typeface="STKaiti"/>
+                              <a:cs typeface="Tahoma" panose="020B0604030504040204" pitchFamily="34" charset="0"/>
+                            </a:rPr>
+                          </m:ctrlPr>
+                        </m:dPr>
+                        <m:e>
+                          <m:r>
+                            <a:rPr lang="en-US" i="1">
+                              <a:effectLst/>
+                              <a:latin typeface="Cambria Math" panose="02040503050406030204" pitchFamily="18" charset="0"/>
+                              <a:ea typeface="STKaiti"/>
+                              <a:cs typeface="Tahoma" panose="020B0604030504040204" pitchFamily="34" charset="0"/>
+                            </a:rPr>
+                            <m:t>8.96∗</m:t>
+                          </m:r>
+                          <m:sSup>
+                            <m:sSupPr>
+                              <m:ctrlPr>
+                                <a:rPr lang="en-US" i="1">
+                                  <a:effectLst/>
+                                  <a:latin typeface="Cambria Math" panose="02040503050406030204" pitchFamily="18" charset="0"/>
+                                  <a:ea typeface="STKaiti"/>
+                                  <a:cs typeface="Tahoma" panose="020B0604030504040204" pitchFamily="34" charset="0"/>
+                                </a:rPr>
+                              </m:ctrlPr>
+                            </m:sSupPr>
+                            <m:e>
+                              <m:r>
+                                <a:rPr lang="en-US" i="1">
+                                  <a:effectLst/>
+                                  <a:latin typeface="Cambria Math" panose="02040503050406030204" pitchFamily="18" charset="0"/>
+                                  <a:ea typeface="STKaiti"/>
+                                  <a:cs typeface="Tahoma" panose="020B0604030504040204" pitchFamily="34" charset="0"/>
+                                </a:rPr>
+                                <m:t>10</m:t>
+                              </m:r>
+                            </m:e>
+                            <m:sup>
+                              <m:r>
+                                <a:rPr lang="en-US" i="1">
+                                  <a:effectLst/>
+                                  <a:latin typeface="Cambria Math" panose="02040503050406030204" pitchFamily="18" charset="0"/>
+                                  <a:ea typeface="STKaiti"/>
+                                  <a:cs typeface="Tahoma" panose="020B0604030504040204" pitchFamily="34" charset="0"/>
+                                </a:rPr>
+                                <m:t>−13</m:t>
+                              </m:r>
+                            </m:sup>
+                          </m:sSup>
+                        </m:e>
+                      </m:d>
+                      <m:r>
+                        <a:rPr lang="en-US" i="1">
+                          <a:effectLst/>
+                          <a:latin typeface="Cambria Math" panose="02040503050406030204" pitchFamily="18" charset="0"/>
+                          <a:ea typeface="STKaiti"/>
+                          <a:cs typeface="Tahoma" panose="020B0604030504040204" pitchFamily="34" charset="0"/>
+                        </a:rPr>
+                        <m:t>𝐽𝑜𝑢𝑙𝑒𝑠</m:t>
+                      </m:r>
+                      <m:r>
+                        <a:rPr lang="en-US" i="1">
+                          <a:effectLst/>
+                          <a:latin typeface="Cambria Math" panose="02040503050406030204" pitchFamily="18" charset="0"/>
+                          <a:ea typeface="STKaiti"/>
+                          <a:cs typeface="Tahoma" panose="020B0604030504040204" pitchFamily="34" charset="0"/>
+                        </a:rPr>
+                        <m:t> </m:t>
+                      </m:r>
+                      <m:r>
+                        <a:rPr lang="en-US" i="1">
+                          <a:effectLst/>
+                          <a:latin typeface="Cambria Math" panose="02040503050406030204" pitchFamily="18" charset="0"/>
+                          <a:ea typeface="STKaiti"/>
+                          <a:cs typeface="Tahoma" panose="020B0604030504040204" pitchFamily="34" charset="0"/>
+                        </a:rPr>
+                        <m:t>𝑎𝑡𝑜</m:t>
+                      </m:r>
+                      <m:sSup>
+                        <m:sSupPr>
+                          <m:ctrlPr>
+                            <a:rPr lang="en-US" i="1">
+                              <a:effectLst/>
+                              <a:latin typeface="Cambria Math" panose="02040503050406030204" pitchFamily="18" charset="0"/>
+                              <a:ea typeface="STKaiti"/>
+                              <a:cs typeface="Tahoma" panose="020B0604030504040204" pitchFamily="34" charset="0"/>
+                            </a:rPr>
+                          </m:ctrlPr>
+                        </m:sSupPr>
+                        <m:e>
+                          <m:r>
+                            <a:rPr lang="en-US" i="1">
+                              <a:effectLst/>
+                              <a:latin typeface="Cambria Math" panose="02040503050406030204" pitchFamily="18" charset="0"/>
+                              <a:ea typeface="STKaiti"/>
+                              <a:cs typeface="Tahoma" panose="020B0604030504040204" pitchFamily="34" charset="0"/>
+                            </a:rPr>
+                            <m:t>𝑚</m:t>
+                          </m:r>
+                        </m:e>
+                        <m:sup>
+                          <m:r>
+                            <a:rPr lang="en-US" i="1">
+                              <a:effectLst/>
+                              <a:latin typeface="Cambria Math" panose="02040503050406030204" pitchFamily="18" charset="0"/>
+                              <a:ea typeface="STKaiti"/>
+                              <a:cs typeface="Tahoma" panose="020B0604030504040204" pitchFamily="34" charset="0"/>
+                            </a:rPr>
+                            <m:t>−1</m:t>
+                          </m:r>
+                        </m:sup>
+                      </m:sSup>
+                    </m:oMath>
+                  </m:oMathPara>
+                </a14:m>
+                <a:endParaRPr lang="en-US" sz="1600" dirty="0">
+                  <a:effectLst/>
+                  <a:latin typeface="Candara" panose="020E0502030303020204" pitchFamily="34" charset="0"/>
+                  <a:ea typeface="STKaiti"/>
+                  <a:cs typeface="Tahoma" panose="020B0604030504040204" pitchFamily="34" charset="0"/>
+                </a:endParaRPr>
+              </a:p>
+              <a:p>
+                <a:pPr>
+                  <a:lnSpc>
+                    <a:spcPct val="107000"/>
+                  </a:lnSpc>
+                  <a:spcAft>
+                    <a:spcPts val="800"/>
+                  </a:spcAft>
+                </a:pPr>
+                <a14:m>
+                  <m:oMathPara xmlns:m="http://schemas.openxmlformats.org/officeDocument/2006/math">
+                    <m:oMathParaPr>
+                      <m:jc m:val="centerGroup"/>
+                    </m:oMathParaPr>
+                    <m:oMath xmlns:m="http://schemas.openxmlformats.org/officeDocument/2006/math">
+                      <m:r>
+                        <a:rPr lang="en-US" i="1">
+                          <a:effectLst/>
+                          <a:latin typeface="Cambria Math" panose="02040503050406030204" pitchFamily="18" charset="0"/>
+                          <a:ea typeface="STKaiti"/>
+                          <a:cs typeface="Tahoma" panose="020B0604030504040204" pitchFamily="34" charset="0"/>
+                        </a:rPr>
+                        <m:t>− 0.9∗5.670 </m:t>
+                      </m:r>
+                      <m:r>
+                        <a:rPr lang="en-US" i="1">
+                          <a:effectLst/>
+                          <a:latin typeface="Cambria Math" panose="02040503050406030204" pitchFamily="18" charset="0"/>
+                          <a:ea typeface="STKaiti"/>
+                          <a:cs typeface="Tahoma" panose="020B0604030504040204" pitchFamily="34" charset="0"/>
+                        </a:rPr>
+                        <m:t>𝑊</m:t>
+                      </m:r>
+                      <m:r>
+                        <a:rPr lang="en-US" i="1">
+                          <a:effectLst/>
+                          <a:latin typeface="Cambria Math" panose="02040503050406030204" pitchFamily="18" charset="0"/>
+                          <a:ea typeface="STKaiti"/>
+                          <a:cs typeface="Tahoma" panose="020B0604030504040204" pitchFamily="34" charset="0"/>
+                        </a:rPr>
+                        <m:t> </m:t>
+                      </m:r>
+                      <m:sSup>
+                        <m:sSupPr>
+                          <m:ctrlPr>
+                            <a:rPr lang="en-US" i="1">
+                              <a:effectLst/>
+                              <a:latin typeface="Cambria Math" panose="02040503050406030204" pitchFamily="18" charset="0"/>
+                              <a:ea typeface="STKaiti"/>
+                              <a:cs typeface="Tahoma" panose="020B0604030504040204" pitchFamily="34" charset="0"/>
+                            </a:rPr>
+                          </m:ctrlPr>
+                        </m:sSupPr>
+                        <m:e>
+                          <m:r>
+                            <a:rPr lang="en-US" i="1">
+                              <a:effectLst/>
+                              <a:latin typeface="Cambria Math" panose="02040503050406030204" pitchFamily="18" charset="0"/>
+                              <a:ea typeface="STKaiti"/>
+                              <a:cs typeface="Tahoma" panose="020B0604030504040204" pitchFamily="34" charset="0"/>
+                            </a:rPr>
+                            <m:t>𝑚</m:t>
+                          </m:r>
+                        </m:e>
+                        <m:sup>
+                          <m:r>
+                            <a:rPr lang="en-US" i="1">
+                              <a:effectLst/>
+                              <a:latin typeface="Cambria Math" panose="02040503050406030204" pitchFamily="18" charset="0"/>
+                              <a:ea typeface="STKaiti"/>
+                              <a:cs typeface="Tahoma" panose="020B0604030504040204" pitchFamily="34" charset="0"/>
+                            </a:rPr>
+                            <m:t>−2</m:t>
+                          </m:r>
+                        </m:sup>
+                      </m:sSup>
+                      <m:sSup>
+                        <m:sSupPr>
+                          <m:ctrlPr>
+                            <a:rPr lang="en-US" i="1">
+                              <a:effectLst/>
+                              <a:latin typeface="Cambria Math" panose="02040503050406030204" pitchFamily="18" charset="0"/>
+                              <a:ea typeface="STKaiti"/>
+                              <a:cs typeface="Tahoma" panose="020B0604030504040204" pitchFamily="34" charset="0"/>
+                            </a:rPr>
+                          </m:ctrlPr>
+                        </m:sSupPr>
+                        <m:e>
+                          <m:r>
+                            <a:rPr lang="en-US" i="1">
+                              <a:effectLst/>
+                              <a:latin typeface="Cambria Math" panose="02040503050406030204" pitchFamily="18" charset="0"/>
+                              <a:ea typeface="STKaiti"/>
+                              <a:cs typeface="Tahoma" panose="020B0604030504040204" pitchFamily="34" charset="0"/>
+                            </a:rPr>
+                            <m:t>𝐾</m:t>
+                          </m:r>
+                        </m:e>
+                        <m:sup>
+                          <m:r>
+                            <a:rPr lang="en-US" i="1">
+                              <a:effectLst/>
+                              <a:latin typeface="Cambria Math" panose="02040503050406030204" pitchFamily="18" charset="0"/>
+                              <a:ea typeface="STKaiti"/>
+                              <a:cs typeface="Tahoma" panose="020B0604030504040204" pitchFamily="34" charset="0"/>
+                            </a:rPr>
+                            <m:t>−4</m:t>
+                          </m:r>
+                        </m:sup>
+                      </m:sSup>
+                      <m:r>
+                        <a:rPr lang="en-US" i="1">
+                          <a:effectLst/>
+                          <a:latin typeface="Cambria Math" panose="02040503050406030204" pitchFamily="18" charset="0"/>
+                          <a:ea typeface="STKaiti"/>
+                          <a:cs typeface="Tahoma" panose="020B0604030504040204" pitchFamily="34" charset="0"/>
+                        </a:rPr>
+                        <m:t>∗(3.1569∗</m:t>
+                      </m:r>
+                      <m:sSup>
+                        <m:sSupPr>
+                          <m:ctrlPr>
+                            <a:rPr lang="en-US" i="1">
+                              <a:effectLst/>
+                              <a:latin typeface="Cambria Math" panose="02040503050406030204" pitchFamily="18" charset="0"/>
+                              <a:ea typeface="STKaiti"/>
+                              <a:cs typeface="Tahoma" panose="020B0604030504040204" pitchFamily="34" charset="0"/>
+                            </a:rPr>
+                          </m:ctrlPr>
+                        </m:sSupPr>
+                        <m:e>
+                          <m:r>
+                            <a:rPr lang="en-US" i="1">
+                              <a:effectLst/>
+                              <a:latin typeface="Cambria Math" panose="02040503050406030204" pitchFamily="18" charset="0"/>
+                              <a:ea typeface="STKaiti"/>
+                              <a:cs typeface="Tahoma" panose="020B0604030504040204" pitchFamily="34" charset="0"/>
+                            </a:rPr>
+                            <m:t>10)</m:t>
+                          </m:r>
+                        </m:e>
+                        <m:sup>
+                          <m:r>
+                            <a:rPr lang="en-US" i="1">
+                              <a:effectLst/>
+                              <a:latin typeface="Cambria Math" panose="02040503050406030204" pitchFamily="18" charset="0"/>
+                              <a:ea typeface="STKaiti"/>
+                              <a:cs typeface="Tahoma" panose="020B0604030504040204" pitchFamily="34" charset="0"/>
+                            </a:rPr>
+                            <m:t>7</m:t>
+                          </m:r>
+                        </m:sup>
+                      </m:sSup>
+                      <m:r>
+                        <a:rPr lang="en-US" i="1">
+                          <a:effectLst/>
+                          <a:latin typeface="Cambria Math" panose="02040503050406030204" pitchFamily="18" charset="0"/>
+                          <a:ea typeface="STKaiti"/>
+                          <a:cs typeface="Tahoma" panose="020B0604030504040204" pitchFamily="34" charset="0"/>
+                        </a:rPr>
+                        <m:t>𝑠</m:t>
+                      </m:r>
+                      <m:r>
+                        <a:rPr lang="en-US" i="1">
+                          <a:effectLst/>
+                          <a:latin typeface="Cambria Math" panose="02040503050406030204" pitchFamily="18" charset="0"/>
+                          <a:ea typeface="STKaiti"/>
+                          <a:cs typeface="Tahoma" panose="020B0604030504040204" pitchFamily="34" charset="0"/>
+                        </a:rPr>
+                        <m:t> </m:t>
+                      </m:r>
+                      <m:r>
+                        <a:rPr lang="en-US" i="1">
+                          <a:effectLst/>
+                          <a:latin typeface="Cambria Math" panose="02040503050406030204" pitchFamily="18" charset="0"/>
+                          <a:ea typeface="STKaiti"/>
+                          <a:cs typeface="Tahoma" panose="020B0604030504040204" pitchFamily="34" charset="0"/>
+                        </a:rPr>
+                        <m:t>𝑦𝑒𝑎</m:t>
+                      </m:r>
+                      <m:sSup>
+                        <m:sSupPr>
+                          <m:ctrlPr>
+                            <a:rPr lang="en-US" i="1">
+                              <a:effectLst/>
+                              <a:latin typeface="Cambria Math" panose="02040503050406030204" pitchFamily="18" charset="0"/>
+                              <a:ea typeface="STKaiti"/>
+                              <a:cs typeface="Tahoma" panose="020B0604030504040204" pitchFamily="34" charset="0"/>
+                            </a:rPr>
+                          </m:ctrlPr>
+                        </m:sSupPr>
+                        <m:e>
+                          <m:r>
+                            <a:rPr lang="en-US" i="1">
+                              <a:effectLst/>
+                              <a:latin typeface="Cambria Math" panose="02040503050406030204" pitchFamily="18" charset="0"/>
+                              <a:ea typeface="STKaiti"/>
+                              <a:cs typeface="Tahoma" panose="020B0604030504040204" pitchFamily="34" charset="0"/>
+                            </a:rPr>
+                            <m:t>𝑟</m:t>
+                          </m:r>
+                        </m:e>
+                        <m:sup>
+                          <m:r>
+                            <a:rPr lang="en-US" i="1">
+                              <a:effectLst/>
+                              <a:latin typeface="Cambria Math" panose="02040503050406030204" pitchFamily="18" charset="0"/>
+                              <a:ea typeface="STKaiti"/>
+                              <a:cs typeface="Tahoma" panose="020B0604030504040204" pitchFamily="34" charset="0"/>
+                            </a:rPr>
+                            <m:t>−1</m:t>
+                          </m:r>
+                        </m:sup>
+                      </m:sSup>
+                      <m:r>
+                        <a:rPr lang="en-US" i="1">
+                          <a:effectLst/>
+                          <a:latin typeface="Cambria Math" panose="02040503050406030204" pitchFamily="18" charset="0"/>
+                          <a:ea typeface="STKaiti"/>
+                          <a:cs typeface="Tahoma" panose="020B0604030504040204" pitchFamily="34" charset="0"/>
+                        </a:rPr>
+                        <m:t>∗</m:t>
+                      </m:r>
+                      <m:sSubSup>
+                        <m:sSubSupPr>
+                          <m:ctrlPr>
+                            <a:rPr lang="en-US" i="1">
+                              <a:effectLst/>
+                              <a:latin typeface="Cambria Math" panose="02040503050406030204" pitchFamily="18" charset="0"/>
+                              <a:ea typeface="STKaiti"/>
+                              <a:cs typeface="Tahoma" panose="020B0604030504040204" pitchFamily="34" charset="0"/>
+                            </a:rPr>
+                          </m:ctrlPr>
+                        </m:sSubSupPr>
+                        <m:e>
+                          <m:r>
+                            <a:rPr lang="en-US" i="1">
+                              <a:effectLst/>
+                              <a:latin typeface="Cambria Math" panose="02040503050406030204" pitchFamily="18" charset="0"/>
+                              <a:ea typeface="STKaiti"/>
+                              <a:cs typeface="Tahoma" panose="020B0604030504040204" pitchFamily="34" charset="0"/>
+                            </a:rPr>
+                            <m:t>𝑇</m:t>
+                          </m:r>
+                        </m:e>
+                        <m:sub>
+                          <m:r>
+                            <a:rPr lang="en-US" i="1">
+                              <a:effectLst/>
+                              <a:latin typeface="Cambria Math" panose="02040503050406030204" pitchFamily="18" charset="0"/>
+                              <a:ea typeface="STKaiti"/>
+                              <a:cs typeface="Tahoma" panose="020B0604030504040204" pitchFamily="34" charset="0"/>
+                            </a:rPr>
+                            <m:t>𝑅𝑇𝐺</m:t>
+                          </m:r>
+                        </m:sub>
+                        <m:sup>
+                          <m:r>
+                            <a:rPr lang="en-US" i="1">
+                              <a:effectLst/>
+                              <a:latin typeface="Cambria Math" panose="02040503050406030204" pitchFamily="18" charset="0"/>
+                              <a:ea typeface="STKaiti"/>
+                              <a:cs typeface="Tahoma" panose="020B0604030504040204" pitchFamily="34" charset="0"/>
+                            </a:rPr>
+                            <m:t>4</m:t>
+                          </m:r>
+                        </m:sup>
+                      </m:sSubSup>
+                    </m:oMath>
+                  </m:oMathPara>
+                </a14:m>
+                <a:endParaRPr lang="en-US" sz="1600" dirty="0">
+                  <a:effectLst/>
+                  <a:latin typeface="Candara" panose="020E0502030303020204" pitchFamily="34" charset="0"/>
+                  <a:ea typeface="STKaiti"/>
+                  <a:cs typeface="Tahoma" panose="020B0604030504040204" pitchFamily="34" charset="0"/>
+                </a:endParaRPr>
+              </a:p>
+            </p:txBody>
+          </p:sp>
+        </mc:Choice>
+        <mc:Fallback>
+          <p:sp>
+            <p:nvSpPr>
+              <p:cNvPr id="3" name="Rectangle 2"/>
+              <p:cNvSpPr>
+                <a:spLocks noRot="1" noChangeAspect="1" noMove="1" noResize="1" noEditPoints="1" noAdjustHandles="1" noChangeArrowheads="1" noChangeShapeType="1" noTextEdit="1"/>
+              </p:cNvSpPr>
+              <p:nvPr/>
+            </p:nvSpPr>
+            <p:spPr>
+              <a:xfrm>
+                <a:off x="4958876" y="2679807"/>
+                <a:ext cx="8427308" cy="1562094"/>
+              </a:xfrm>
+              <a:prstGeom prst="rect">
+                <a:avLst/>
+              </a:prstGeom>
+              <a:blipFill rotWithShape="0">
+                <a:blip r:embed="rId3"/>
+                <a:stretch>
+                  <a:fillRect/>
+                </a:stretch>
+              </a:blipFill>
+            </p:spPr>
+            <p:txBody>
+              <a:bodyPr/>
+              <a:lstStyle/>
+              <a:p>
+                <a:r>
+                  <a:rPr lang="en-US">
+                    <a:noFill/>
+                  </a:rPr>
+                  <a:t> </a:t>
+                </a:r>
+              </a:p>
+            </p:txBody>
+          </p:sp>
+        </mc:Fallback>
+      </mc:AlternateContent>
+      <mc:AlternateContent xmlns:mc="http://schemas.openxmlformats.org/markup-compatibility/2006">
+        <mc:Choice xmlns:a14="http://schemas.microsoft.com/office/drawing/2010/main" Requires="a14">
+          <p:sp>
+            <p:nvSpPr>
+              <p:cNvPr id="4" name="Rectangle 3"/>
+              <p:cNvSpPr/>
+              <p:nvPr/>
+            </p:nvSpPr>
+            <p:spPr>
+              <a:xfrm>
+                <a:off x="6674212" y="4488061"/>
+                <a:ext cx="3516924" cy="808298"/>
+              </a:xfrm>
+              <a:prstGeom prst="rect">
+                <a:avLst/>
+              </a:prstGeom>
+            </p:spPr>
+            <p:txBody>
+              <a:bodyPr wrap="none">
+                <a:spAutoFit/>
+              </a:bodyPr>
+              <a:lstStyle/>
+              <a:p>
+                <a:pPr>
+                  <a:lnSpc>
+                    <a:spcPct val="107000"/>
+                  </a:lnSpc>
+                  <a:spcAft>
+                    <a:spcPts val="800"/>
+                  </a:spcAft>
+                </a:pPr>
+                <a14:m>
+                  <m:oMathPara xmlns:m="http://schemas.openxmlformats.org/officeDocument/2006/math">
+                    <m:oMathParaPr>
+                      <m:jc m:val="centerGroup"/>
+                    </m:oMathParaPr>
+                    <m:oMath xmlns:m="http://schemas.openxmlformats.org/officeDocument/2006/math">
+                      <m:f>
+                        <m:fPr>
+                          <m:ctrlPr>
+                            <a:rPr lang="en-US" i="1">
+                              <a:latin typeface="Cambria Math" panose="02040503050406030204" pitchFamily="18" charset="0"/>
+                              <a:ea typeface="STKaiti"/>
+                              <a:cs typeface="Tahoma" panose="020B0604030504040204" pitchFamily="34" charset="0"/>
+                            </a:rPr>
+                          </m:ctrlPr>
+                        </m:fPr>
+                        <m:num>
+                          <m:r>
+                            <a:rPr lang="en-US" i="1">
+                              <a:latin typeface="Cambria Math" panose="02040503050406030204" pitchFamily="18" charset="0"/>
+                              <a:ea typeface="STKaiti"/>
+                              <a:cs typeface="Tahoma" panose="020B0604030504040204" pitchFamily="34" charset="0"/>
+                            </a:rPr>
+                            <m:t>𝑑𝐴</m:t>
+                          </m:r>
+                        </m:num>
+                        <m:den>
+                          <m:r>
+                            <a:rPr lang="en-US" i="1">
+                              <a:latin typeface="Cambria Math" panose="02040503050406030204" pitchFamily="18" charset="0"/>
+                              <a:ea typeface="STKaiti"/>
+                              <a:cs typeface="Tahoma" panose="020B0604030504040204" pitchFamily="34" charset="0"/>
+                            </a:rPr>
+                            <m:t>𝑑𝑡</m:t>
+                          </m:r>
+                        </m:den>
+                      </m:f>
+                      <m:r>
+                        <a:rPr lang="en-US" i="1">
+                          <a:latin typeface="Cambria Math" panose="02040503050406030204" pitchFamily="18" charset="0"/>
+                          <a:ea typeface="STKaiti"/>
+                          <a:cs typeface="Tahoma" panose="020B0604030504040204" pitchFamily="34" charset="0"/>
+                        </a:rPr>
+                        <m:t>=−</m:t>
+                      </m:r>
+                      <m:func>
+                        <m:funcPr>
+                          <m:ctrlPr>
+                            <a:rPr lang="en-US" i="1">
+                              <a:latin typeface="Cambria Math" panose="02040503050406030204" pitchFamily="18" charset="0"/>
+                              <a:ea typeface="STKaiti"/>
+                              <a:cs typeface="Tahoma" panose="020B0604030504040204" pitchFamily="34" charset="0"/>
+                            </a:rPr>
+                          </m:ctrlPr>
+                        </m:funcPr>
+                        <m:fName>
+                          <m:r>
+                            <m:rPr>
+                              <m:sty m:val="p"/>
+                            </m:rPr>
+                            <a:rPr lang="en-US">
+                              <a:latin typeface="Cambria Math" panose="02040503050406030204" pitchFamily="18" charset="0"/>
+                              <a:ea typeface="STKaiti"/>
+                              <a:cs typeface="Tahoma" panose="020B0604030504040204" pitchFamily="34" charset="0"/>
+                            </a:rPr>
+                            <m:t>ln</m:t>
+                          </m:r>
+                        </m:fName>
+                        <m:e>
+                          <m:d>
+                            <m:dPr>
+                              <m:ctrlPr>
+                                <a:rPr lang="en-US" i="1">
+                                  <a:latin typeface="Cambria Math" panose="02040503050406030204" pitchFamily="18" charset="0"/>
+                                  <a:ea typeface="STKaiti"/>
+                                  <a:cs typeface="Tahoma" panose="020B0604030504040204" pitchFamily="34" charset="0"/>
+                                </a:rPr>
+                              </m:ctrlPr>
+                            </m:dPr>
+                            <m:e>
+                              <m:r>
+                                <a:rPr lang="en-US" i="1">
+                                  <a:latin typeface="Cambria Math" panose="02040503050406030204" pitchFamily="18" charset="0"/>
+                                  <a:ea typeface="STKaiti"/>
+                                  <a:cs typeface="Tahoma" panose="020B0604030504040204" pitchFamily="34" charset="0"/>
+                                </a:rPr>
+                                <m:t>2</m:t>
+                              </m:r>
+                            </m:e>
+                          </m:d>
+                        </m:e>
+                      </m:func>
+                      <m:r>
+                        <a:rPr lang="en-US" i="1">
+                          <a:latin typeface="Cambria Math" panose="02040503050406030204" pitchFamily="18" charset="0"/>
+                          <a:ea typeface="STKaiti"/>
+                          <a:cs typeface="Tahoma" panose="020B0604030504040204" pitchFamily="34" charset="0"/>
+                        </a:rPr>
+                        <m:t>∗</m:t>
+                      </m:r>
+                      <m:f>
+                        <m:fPr>
+                          <m:ctrlPr>
+                            <a:rPr lang="en-US" i="1">
+                              <a:latin typeface="Cambria Math" panose="02040503050406030204" pitchFamily="18" charset="0"/>
+                              <a:ea typeface="STKaiti"/>
+                              <a:cs typeface="Tahoma" panose="020B0604030504040204" pitchFamily="34" charset="0"/>
+                            </a:rPr>
+                          </m:ctrlPr>
+                        </m:fPr>
+                        <m:num>
+                          <m:r>
+                            <a:rPr lang="en-US" i="1">
+                              <a:latin typeface="Cambria Math" panose="02040503050406030204" pitchFamily="18" charset="0"/>
+                              <a:ea typeface="STKaiti"/>
+                              <a:cs typeface="Tahoma" panose="020B0604030504040204" pitchFamily="34" charset="0"/>
+                            </a:rPr>
+                            <m:t>1</m:t>
+                          </m:r>
+                        </m:num>
+                        <m:den>
+                          <m:r>
+                            <a:rPr lang="en-US" i="1">
+                              <a:latin typeface="Cambria Math" panose="02040503050406030204" pitchFamily="18" charset="0"/>
+                              <a:ea typeface="STKaiti"/>
+                              <a:cs typeface="Tahoma" panose="020B0604030504040204" pitchFamily="34" charset="0"/>
+                            </a:rPr>
+                            <m:t>87.7 </m:t>
+                          </m:r>
+                          <m:r>
+                            <a:rPr lang="en-US" i="1">
+                              <a:latin typeface="Cambria Math" panose="02040503050406030204" pitchFamily="18" charset="0"/>
+                              <a:ea typeface="STKaiti"/>
+                              <a:cs typeface="Tahoma" panose="020B0604030504040204" pitchFamily="34" charset="0"/>
+                            </a:rPr>
+                            <m:t>𝑦𝑒𝑎𝑟𝑠</m:t>
+                          </m:r>
+                        </m:den>
+                      </m:f>
+                      <m:r>
+                        <a:rPr lang="en-US" i="1">
+                          <a:latin typeface="Cambria Math" panose="02040503050406030204" pitchFamily="18" charset="0"/>
+                          <a:ea typeface="STKaiti"/>
+                          <a:cs typeface="Tahoma" panose="020B0604030504040204" pitchFamily="34" charset="0"/>
+                        </a:rPr>
+                        <m:t>∗</m:t>
+                      </m:r>
+                      <m:r>
+                        <a:rPr lang="en-US" i="1">
+                          <a:latin typeface="Cambria Math" panose="02040503050406030204" pitchFamily="18" charset="0"/>
+                          <a:ea typeface="STKaiti"/>
+                          <a:cs typeface="Tahoma" panose="020B0604030504040204" pitchFamily="34" charset="0"/>
+                        </a:rPr>
+                        <m:t>𝐴</m:t>
+                      </m:r>
+                      <m:r>
+                        <a:rPr lang="en-US" i="1">
+                          <a:latin typeface="Cambria Math" panose="02040503050406030204" pitchFamily="18" charset="0"/>
+                          <a:ea typeface="STKaiti"/>
+                          <a:cs typeface="Tahoma" panose="020B0604030504040204" pitchFamily="34" charset="0"/>
+                        </a:rPr>
+                        <m:t> </m:t>
+                      </m:r>
+                      <m:r>
+                        <a:rPr lang="en-US" i="1">
+                          <a:latin typeface="Cambria Math" panose="02040503050406030204" pitchFamily="18" charset="0"/>
+                          <a:ea typeface="STKaiti"/>
+                          <a:cs typeface="Tahoma" panose="020B0604030504040204" pitchFamily="34" charset="0"/>
+                        </a:rPr>
+                        <m:t>𝑘𝑔</m:t>
+                      </m:r>
+                    </m:oMath>
+                  </m:oMathPara>
+                </a14:m>
+                <a:endParaRPr lang="en-US" sz="1600" dirty="0">
+                  <a:latin typeface="Candara" panose="020E0502030303020204" pitchFamily="34" charset="0"/>
+                  <a:ea typeface="STKaiti"/>
+                  <a:cs typeface="Tahoma" panose="020B0604030504040204" pitchFamily="34" charset="0"/>
+                </a:endParaRPr>
+              </a:p>
+            </p:txBody>
+          </p:sp>
+        </mc:Choice>
+        <mc:Fallback>
+          <p:sp>
+            <p:nvSpPr>
+              <p:cNvPr id="4" name="Rectangle 3"/>
+              <p:cNvSpPr>
+                <a:spLocks noRot="1" noChangeAspect="1" noMove="1" noResize="1" noEditPoints="1" noAdjustHandles="1" noChangeArrowheads="1" noChangeShapeType="1" noTextEdit="1"/>
+              </p:cNvSpPr>
+              <p:nvPr/>
+            </p:nvSpPr>
+            <p:spPr>
+              <a:xfrm>
+                <a:off x="6674212" y="4488061"/>
+                <a:ext cx="3516924" cy="808298"/>
+              </a:xfrm>
+              <a:prstGeom prst="rect">
+                <a:avLst/>
+              </a:prstGeom>
+              <a:blipFill rotWithShape="0">
+                <a:blip r:embed="rId4"/>
+                <a:stretch>
+                  <a:fillRect/>
+                </a:stretch>
+              </a:blipFill>
+            </p:spPr>
+            <p:txBody>
+              <a:bodyPr/>
+              <a:lstStyle/>
+              <a:p>
+                <a:r>
+                  <a:rPr lang="en-US">
+                    <a:noFill/>
+                  </a:rPr>
+                  <a:t> </a:t>
+                </a:r>
+              </a:p>
+            </p:txBody>
+          </p:sp>
+        </mc:Fallback>
+      </mc:AlternateContent>
     </p:spTree>
     <p:extLst>
       <p:ext uri="{BB962C8B-B14F-4D97-AF65-F5344CB8AC3E}">
@@ -4542,7 +5583,7 @@
           <a:p>
             <a:r>
               <a:rPr lang="en-US" dirty="0" smtClean="0"/>
-              <a:t>Our Design Recommendation</a:t>
+              <a:t>Our Takeaways</a:t>
             </a:r>
             <a:endParaRPr lang="en-US" dirty="0"/>
           </a:p>
@@ -4624,21 +5665,56 @@
           <a:p>
             <a:r>
               <a:rPr lang="en-US" dirty="0" smtClean="0"/>
-              <a:t>LOL JK MORE FAILURES</a:t>
+              <a:t>Our Design Recommendation</a:t>
             </a:r>
             <a:endParaRPr lang="en-US" dirty="0"/>
+          </a:p>
+        </p:txBody>
+      </p:sp>
+      <p:sp>
+        <p:nvSpPr>
+          <p:cNvPr id="5" name="Content Placeholder 4"/>
+          <p:cNvSpPr>
+            <a:spLocks noGrp="1"/>
+          </p:cNvSpPr>
+          <p:nvPr>
+            <p:ph idx="1"/>
+          </p:nvPr>
+        </p:nvSpPr>
+        <p:spPr/>
+        <p:txBody>
+          <a:bodyPr/>
+          <a:lstStyle/>
+          <a:p>
+            <a:r>
+              <a:rPr lang="en-US" dirty="0" smtClean="0"/>
+              <a:t>Probe to Alpha Centauri B Orbit: 105 years</a:t>
+            </a:r>
+          </a:p>
+          <a:p>
+            <a:r>
+              <a:rPr lang="en-US" dirty="0" smtClean="0"/>
+              <a:t>Mandated Power Threshold: 240W</a:t>
+            </a:r>
+          </a:p>
+          <a:p>
+            <a:r>
+              <a:rPr lang="en-US" dirty="0" smtClean="0"/>
+              <a:t>Minimum Pu-238: </a:t>
+            </a:r>
+          </a:p>
+          <a:p>
+            <a:endParaRPr lang="en-US" dirty="0" smtClean="0"/>
           </a:p>
         </p:txBody>
       </p:sp>
       <p:pic>
         <p:nvPicPr>
-          <p:cNvPr id="4" name="Content Placeholder 3"/>
+          <p:cNvPr id="6" name="Picture 5"/>
           <p:cNvPicPr>
-            <a:picLocks noGrp="1" noChangeAspect="1"/>
+            <a:picLocks noChangeAspect="1"/>
           </p:cNvPicPr>
-          <p:nvPr>
-            <p:ph idx="1"/>
-          </p:nvPr>
+          <p:nvPr/>
         </p:nvPicPr>
         <p:blipFill>
           <a:blip r:embed="rId2"/>
@@ -4648,8 +5724,8 @@
         </p:blipFill>
         <p:spPr>
           <a:xfrm>
-            <a:off x="3445666" y="1846263"/>
-            <a:ext cx="5360993" cy="4022725"/>
+            <a:off x="5691256" y="1845734"/>
+            <a:ext cx="5664232" cy="4250266"/>
           </a:xfrm>
           <a:prstGeom prst="rect">
             <a:avLst/>

</xml_diff>

<commit_message>
Now there's a punchline figure, and the scale is right, and everything is wonderful.
</commit_message>
<xml_diff>
--- a/On RTG Design.pptx
+++ b/On RTG Design.pptx
@@ -4094,7 +4094,7 @@
         </p:blipFill>
         <p:spPr>
           <a:xfrm>
-            <a:off x="445928" y="1877404"/>
+            <a:off x="180934" y="1737360"/>
             <a:ext cx="5945546" cy="8230484"/>
           </a:xfrm>
           <a:prstGeom prst="rect">
@@ -4102,8 +4102,8 @@
           </a:prstGeom>
         </p:spPr>
       </p:pic>
-      <mc:AlternateContent xmlns:mc="http://schemas.openxmlformats.org/markup-compatibility/2006">
-        <mc:Choice xmlns:a14="http://schemas.microsoft.com/office/drawing/2010/main" Requires="a14">
+      <mc:AlternateContent xmlns:mc="http://schemas.openxmlformats.org/markup-compatibility/2006" xmlns:a14="http://schemas.microsoft.com/office/drawing/2010/main">
+        <mc:Choice Requires="a14">
           <p:sp>
             <p:nvSpPr>
               <p:cNvPr id="3" name="Rectangle 2"/>
@@ -4847,7 +4847,7 @@
             </p:txBody>
           </p:sp>
         </mc:Choice>
-        <mc:Fallback>
+        <mc:Fallback xmlns="">
           <p:sp>
             <p:nvSpPr>
               <p:cNvPr id="3" name="Rectangle 2"/>
@@ -4886,8 +4886,8 @@
           </p:sp>
         </mc:Fallback>
       </mc:AlternateContent>
-      <mc:AlternateContent xmlns:mc="http://schemas.openxmlformats.org/markup-compatibility/2006">
-        <mc:Choice xmlns:a14="http://schemas.microsoft.com/office/drawing/2010/main" Requires="a14">
+      <mc:AlternateContent xmlns:mc="http://schemas.openxmlformats.org/markup-compatibility/2006" xmlns:a14="http://schemas.microsoft.com/office/drawing/2010/main">
+        <mc:Choice Requires="a14">
           <p:sp>
             <p:nvSpPr>
               <p:cNvPr id="4" name="Rectangle 3"/>
@@ -5100,7 +5100,7 @@
             </p:txBody>
           </p:sp>
         </mc:Choice>
-        <mc:Fallback>
+        <mc:Fallback xmlns="">
           <p:sp>
             <p:nvSpPr>
               <p:cNvPr id="4" name="Rectangle 3"/>
@@ -5710,7 +5710,7 @@
       </p:sp>
       <p:pic>
         <p:nvPicPr>
-          <p:cNvPr id="6" name="Picture 5"/>
+          <p:cNvPr id="3" name="Picture 2"/>
           <p:cNvPicPr>
             <a:picLocks noChangeAspect="1"/>
           </p:cNvPicPr>
@@ -5724,8 +5724,8 @@
         </p:blipFill>
         <p:spPr>
           <a:xfrm>
-            <a:off x="5691256" y="1845734"/>
-            <a:ext cx="5664232" cy="4250266"/>
+            <a:off x="5803935" y="1672281"/>
+            <a:ext cx="6206834" cy="4657418"/>
           </a:xfrm>
           <a:prstGeom prst="rect">
             <a:avLst/>

</xml_diff>

<commit_message>
Finished the presentation and the design report
</commit_message>
<xml_diff>
--- a/On RTG Design.pptx
+++ b/On RTG Design.pptx
@@ -7,12 +7,15 @@
   <p:sldIdLst>
     <p:sldId id="256" r:id="rId2"/>
     <p:sldId id="258" r:id="rId3"/>
-    <p:sldId id="257" r:id="rId4"/>
-    <p:sldId id="259" r:id="rId5"/>
-    <p:sldId id="262" r:id="rId6"/>
-    <p:sldId id="261" r:id="rId7"/>
-    <p:sldId id="260" r:id="rId8"/>
-    <p:sldId id="263" r:id="rId9"/>
+    <p:sldId id="264" r:id="rId4"/>
+    <p:sldId id="257" r:id="rId5"/>
+    <p:sldId id="266" r:id="rId6"/>
+    <p:sldId id="259" r:id="rId7"/>
+    <p:sldId id="265" r:id="rId8"/>
+    <p:sldId id="262" r:id="rId9"/>
+    <p:sldId id="261" r:id="rId10"/>
+    <p:sldId id="260" r:id="rId11"/>
+    <p:sldId id="263" r:id="rId12"/>
   </p:sldIdLst>
   <p:sldSz cx="12192000" cy="6858000"/>
   <p:notesSz cx="6858000" cy="9144000"/>
@@ -3882,6 +3885,683 @@
 </p:sld>
 </file>
 
+<file path=ppt/slides/slide10.xml><?xml version="1.0" encoding="utf-8"?>
+<p:sld xmlns:a="http://schemas.openxmlformats.org/drawingml/2006/main" xmlns:r="http://schemas.openxmlformats.org/officeDocument/2006/relationships" xmlns:p="http://schemas.openxmlformats.org/presentationml/2006/main">
+  <p:cSld>
+    <p:spTree>
+      <p:nvGrpSpPr>
+        <p:cNvPr id="1" name=""/>
+        <p:cNvGrpSpPr/>
+        <p:nvPr/>
+      </p:nvGrpSpPr>
+      <p:grpSpPr>
+        <a:xfrm>
+          <a:off x="0" y="0"/>
+          <a:ext cx="0" cy="0"/>
+          <a:chOff x="0" y="0"/>
+          <a:chExt cx="0" cy="0"/>
+        </a:xfrm>
+      </p:grpSpPr>
+      <p:sp>
+        <p:nvSpPr>
+          <p:cNvPr id="2" name="Title 1"/>
+          <p:cNvSpPr>
+            <a:spLocks noGrp="1"/>
+          </p:cNvSpPr>
+          <p:nvPr>
+            <p:ph type="title"/>
+          </p:nvPr>
+        </p:nvSpPr>
+        <p:spPr/>
+        <p:txBody>
+          <a:bodyPr/>
+          <a:lstStyle/>
+          <a:p>
+            <a:r>
+              <a:rPr lang="en-US" dirty="0" smtClean="0"/>
+              <a:t>Our Takeaways</a:t>
+            </a:r>
+            <a:endParaRPr lang="en-US" dirty="0"/>
+          </a:p>
+        </p:txBody>
+      </p:sp>
+      <p:sp>
+        <p:nvSpPr>
+          <p:cNvPr id="3" name="Content Placeholder 2"/>
+          <p:cNvSpPr>
+            <a:spLocks noGrp="1"/>
+          </p:cNvSpPr>
+          <p:nvPr>
+            <p:ph idx="1"/>
+          </p:nvPr>
+        </p:nvSpPr>
+        <p:spPr/>
+        <p:txBody>
+          <a:bodyPr/>
+          <a:lstStyle/>
+          <a:p>
+            <a:pPr>
+              <a:lnSpc>
+                <a:spcPct val="150000"/>
+              </a:lnSpc>
+              <a:buFont typeface="Wingdings" panose="05000000000000000000" pitchFamily="2" charset="2"/>
+              <a:buChar char="§"/>
+            </a:pPr>
+            <a:r>
+              <a:rPr lang="en-US" sz="2800" dirty="0" smtClean="0"/>
+              <a:t> Insight Maker isn’t worth the effort</a:t>
+            </a:r>
+            <a:endParaRPr lang="en-US" sz="2800" dirty="0"/>
+          </a:p>
+          <a:p>
+            <a:pPr>
+              <a:lnSpc>
+                <a:spcPct val="150000"/>
+              </a:lnSpc>
+              <a:buFont typeface="Wingdings" panose="05000000000000000000" pitchFamily="2" charset="2"/>
+              <a:buChar char="§"/>
+            </a:pPr>
+            <a:r>
+              <a:rPr lang="en-US" sz="2800" dirty="0" smtClean="0"/>
+              <a:t> Some ODE solvers work better for </a:t>
+            </a:r>
+            <a:r>
+              <a:rPr lang="en-US" sz="2800" dirty="0" smtClean="0">
+                <a:hlinkClick r:id="rId2"/>
+              </a:rPr>
+              <a:t>some things</a:t>
+            </a:r>
+            <a:r>
+              <a:rPr lang="en-US" sz="2800" dirty="0" smtClean="0"/>
+              <a:t> than others</a:t>
+            </a:r>
+            <a:endParaRPr lang="en-US" sz="2800" dirty="0"/>
+          </a:p>
+          <a:p>
+            <a:pPr>
+              <a:lnSpc>
+                <a:spcPct val="150000"/>
+              </a:lnSpc>
+              <a:buFont typeface="Wingdings" panose="05000000000000000000" pitchFamily="2" charset="2"/>
+              <a:buChar char="§"/>
+            </a:pPr>
+            <a:r>
+              <a:rPr lang="en-US" sz="2800" dirty="0" smtClean="0"/>
+              <a:t> Pair programming and fresh eyes work wonders</a:t>
+            </a:r>
+            <a:endParaRPr lang="en-US" sz="2800" dirty="0"/>
+          </a:p>
+          <a:p>
+            <a:pPr>
+              <a:lnSpc>
+                <a:spcPct val="150000"/>
+              </a:lnSpc>
+              <a:buFont typeface="Wingdings" panose="05000000000000000000" pitchFamily="2" charset="2"/>
+              <a:buChar char="§"/>
+            </a:pPr>
+            <a:r>
+              <a:rPr lang="en-US" sz="2800" dirty="0" smtClean="0"/>
+              <a:t> Close enough is good enough</a:t>
+            </a:r>
+          </a:p>
+        </p:txBody>
+      </p:sp>
+    </p:spTree>
+    <p:extLst>
+      <p:ext uri="{BB962C8B-B14F-4D97-AF65-F5344CB8AC3E}">
+        <p14:creationId xmlns:p14="http://schemas.microsoft.com/office/powerpoint/2010/main" val="11752898"/>
+      </p:ext>
+    </p:extLst>
+  </p:cSld>
+  <p:clrMapOvr>
+    <a:masterClrMapping/>
+  </p:clrMapOvr>
+  <p:timing>
+    <p:tnLst>
+      <p:par>
+        <p:cTn id="1" dur="indefinite" restart="never" nodeType="tmRoot"/>
+      </p:par>
+    </p:tnLst>
+  </p:timing>
+</p:sld>
+</file>
+
+<file path=ppt/slides/slide11.xml><?xml version="1.0" encoding="utf-8"?>
+<p:sld xmlns:a="http://schemas.openxmlformats.org/drawingml/2006/main" xmlns:r="http://schemas.openxmlformats.org/officeDocument/2006/relationships" xmlns:p="http://schemas.openxmlformats.org/presentationml/2006/main">
+  <p:cSld>
+    <p:spTree>
+      <p:nvGrpSpPr>
+        <p:cNvPr id="1" name=""/>
+        <p:cNvGrpSpPr/>
+        <p:nvPr/>
+      </p:nvGrpSpPr>
+      <p:grpSpPr>
+        <a:xfrm>
+          <a:off x="0" y="0"/>
+          <a:ext cx="0" cy="0"/>
+          <a:chOff x="0" y="0"/>
+          <a:chExt cx="0" cy="0"/>
+        </a:xfrm>
+      </p:grpSpPr>
+      <p:sp>
+        <p:nvSpPr>
+          <p:cNvPr id="2" name="Title 1"/>
+          <p:cNvSpPr>
+            <a:spLocks noGrp="1"/>
+          </p:cNvSpPr>
+          <p:nvPr>
+            <p:ph type="title"/>
+          </p:nvPr>
+        </p:nvSpPr>
+        <p:spPr/>
+        <p:txBody>
+          <a:bodyPr/>
+          <a:lstStyle/>
+          <a:p>
+            <a:r>
+              <a:rPr lang="en-US" dirty="0" smtClean="0"/>
+              <a:t>Our Design Recommendation</a:t>
+            </a:r>
+            <a:endParaRPr lang="en-US" dirty="0"/>
+          </a:p>
+        </p:txBody>
+      </p:sp>
+      <p:sp>
+        <p:nvSpPr>
+          <p:cNvPr id="5" name="Content Placeholder 4"/>
+          <p:cNvSpPr>
+            <a:spLocks noGrp="1"/>
+          </p:cNvSpPr>
+          <p:nvPr>
+            <p:ph idx="1"/>
+          </p:nvPr>
+        </p:nvSpPr>
+        <p:spPr/>
+        <p:txBody>
+          <a:bodyPr/>
+          <a:lstStyle/>
+          <a:p>
+            <a:r>
+              <a:rPr lang="en-US" dirty="0" smtClean="0"/>
+              <a:t>Length of New Horizons Mission: 10 </a:t>
+            </a:r>
+            <a:r>
+              <a:rPr lang="en-US" dirty="0" smtClean="0"/>
+              <a:t>years</a:t>
+            </a:r>
+          </a:p>
+          <a:p>
+            <a:r>
+              <a:rPr lang="en-US" dirty="0" smtClean="0"/>
+              <a:t>Mandated Power Threshold: </a:t>
+            </a:r>
+            <a:r>
+              <a:rPr lang="en-US" dirty="0" smtClean="0"/>
+              <a:t>200W</a:t>
+            </a:r>
+          </a:p>
+          <a:p>
+            <a:r>
+              <a:rPr lang="en-US" dirty="0" smtClean="0"/>
+              <a:t>Required </a:t>
+            </a:r>
+            <a:r>
+              <a:rPr lang="en-US" baseline="30000" dirty="0">
+                <a:solidFill>
+                  <a:srgbClr val="404040"/>
+                </a:solidFill>
+              </a:rPr>
+              <a:t>238</a:t>
+            </a:r>
+            <a:r>
+              <a:rPr lang="en-US" dirty="0">
+                <a:solidFill>
+                  <a:srgbClr val="404040"/>
+                </a:solidFill>
+              </a:rPr>
+              <a:t> Pu payload: 7 kg</a:t>
+            </a:r>
+            <a:endParaRPr lang="en-US" dirty="0"/>
+          </a:p>
+          <a:p>
+            <a:r>
+              <a:rPr lang="en-US" dirty="0">
+                <a:solidFill>
+                  <a:srgbClr val="404040"/>
+                </a:solidFill>
+              </a:rPr>
+              <a:t>New Horizons </a:t>
+            </a:r>
+            <a:r>
+              <a:rPr lang="en-US" baseline="30000" dirty="0">
+                <a:solidFill>
+                  <a:srgbClr val="404040"/>
+                </a:solidFill>
+              </a:rPr>
+              <a:t>238</a:t>
+            </a:r>
+            <a:r>
+              <a:rPr lang="en-US" dirty="0">
+                <a:solidFill>
+                  <a:srgbClr val="404040"/>
+                </a:solidFill>
+              </a:rPr>
+              <a:t> Pu Payload: </a:t>
+            </a:r>
+            <a:r>
+              <a:rPr lang="en-US" dirty="0">
+                <a:solidFill>
+                  <a:srgbClr val="FF0000"/>
+                </a:solidFill>
+              </a:rPr>
+              <a:t>8.6 kg</a:t>
+            </a:r>
+            <a:endParaRPr lang="en-US" baseline="30000" dirty="0">
+              <a:solidFill>
+                <a:srgbClr val="FF0000"/>
+              </a:solidFill>
+            </a:endParaRPr>
+          </a:p>
+          <a:p>
+            <a:endParaRPr lang="en-US" dirty="0" smtClean="0"/>
+          </a:p>
+          <a:p>
+            <a:r>
+              <a:rPr lang="en-US" dirty="0" smtClean="0"/>
+              <a:t>At </a:t>
+            </a:r>
+            <a:r>
+              <a:rPr lang="en-US" dirty="0" smtClean="0">
+                <a:solidFill>
+                  <a:srgbClr val="FF0000"/>
+                </a:solidFill>
+              </a:rPr>
+              <a:t>$8 million</a:t>
+            </a:r>
+            <a:r>
+              <a:rPr lang="en-US" dirty="0" smtClean="0"/>
+              <a:t> per kg of </a:t>
+            </a:r>
+            <a:r>
+              <a:rPr lang="en-US" baseline="30000" dirty="0">
+                <a:solidFill>
+                  <a:srgbClr val="404040"/>
+                </a:solidFill>
+              </a:rPr>
+              <a:t>238</a:t>
+            </a:r>
+            <a:r>
+              <a:rPr lang="en-US" dirty="0">
+                <a:solidFill>
+                  <a:srgbClr val="404040"/>
+                </a:solidFill>
+              </a:rPr>
+              <a:t> </a:t>
+            </a:r>
+            <a:r>
+              <a:rPr lang="en-US" dirty="0" smtClean="0">
+                <a:solidFill>
+                  <a:srgbClr val="404040"/>
+                </a:solidFill>
+              </a:rPr>
+              <a:t>Pu,</a:t>
+            </a:r>
+          </a:p>
+          <a:p>
+            <a:endParaRPr lang="en-US" dirty="0">
+              <a:solidFill>
+                <a:srgbClr val="404040"/>
+              </a:solidFill>
+            </a:endParaRPr>
+          </a:p>
+          <a:p>
+            <a:r>
+              <a:rPr lang="en-US" dirty="0" smtClean="0">
+                <a:solidFill>
+                  <a:srgbClr val="404040"/>
+                </a:solidFill>
+              </a:rPr>
+              <a:t>We could have saved NASA </a:t>
+            </a:r>
+            <a:r>
+              <a:rPr lang="en-US" dirty="0" smtClean="0">
+                <a:solidFill>
+                  <a:srgbClr val="FF0000"/>
+                </a:solidFill>
+              </a:rPr>
+              <a:t>12.8 million dollars</a:t>
+            </a:r>
+            <a:endParaRPr lang="en-US" dirty="0" smtClean="0">
+              <a:solidFill>
+                <a:srgbClr val="FF0000"/>
+              </a:solidFill>
+            </a:endParaRPr>
+          </a:p>
+        </p:txBody>
+      </p:sp>
+      <p:grpSp>
+        <p:nvGrpSpPr>
+          <p:cNvPr id="20" name="Group 19"/>
+          <p:cNvGrpSpPr/>
+          <p:nvPr/>
+        </p:nvGrpSpPr>
+        <p:grpSpPr>
+          <a:xfrm>
+            <a:off x="5803935" y="1672281"/>
+            <a:ext cx="6206834" cy="4657418"/>
+            <a:chOff x="5803935" y="1672281"/>
+            <a:chExt cx="6206834" cy="4657418"/>
+          </a:xfrm>
+        </p:grpSpPr>
+        <p:pic>
+          <p:nvPicPr>
+            <p:cNvPr id="3" name="Picture 2"/>
+            <p:cNvPicPr>
+              <a:picLocks noChangeAspect="1"/>
+            </p:cNvPicPr>
+            <p:nvPr/>
+          </p:nvPicPr>
+          <p:blipFill>
+            <a:blip r:embed="rId2"/>
+            <a:stretch>
+              <a:fillRect/>
+            </a:stretch>
+          </p:blipFill>
+          <p:spPr>
+            <a:xfrm>
+              <a:off x="5803935" y="1672281"/>
+              <a:ext cx="6206834" cy="4657418"/>
+            </a:xfrm>
+            <a:prstGeom prst="rect">
+              <a:avLst/>
+            </a:prstGeom>
+          </p:spPr>
+        </p:pic>
+        <p:grpSp>
+          <p:nvGrpSpPr>
+            <p:cNvPr id="7" name="Group 6"/>
+            <p:cNvGrpSpPr/>
+            <p:nvPr/>
+          </p:nvGrpSpPr>
+          <p:grpSpPr>
+            <a:xfrm>
+              <a:off x="6614983" y="3746203"/>
+              <a:ext cx="1688758" cy="415498"/>
+              <a:chOff x="6614983" y="3746203"/>
+              <a:chExt cx="1491048" cy="415498"/>
+            </a:xfrm>
+          </p:grpSpPr>
+          <p:sp>
+            <p:nvSpPr>
+              <p:cNvPr id="4" name="Flowchart: Off-page Connector 3"/>
+              <p:cNvSpPr/>
+              <p:nvPr/>
+            </p:nvSpPr>
+            <p:spPr>
+              <a:xfrm>
+                <a:off x="6614983" y="3828583"/>
+                <a:ext cx="82381" cy="100868"/>
+              </a:xfrm>
+              <a:prstGeom prst="flowChartOffpageConnector">
+                <a:avLst/>
+              </a:prstGeom>
+            </p:spPr>
+            <p:style>
+              <a:lnRef idx="2">
+                <a:schemeClr val="accent1">
+                  <a:shade val="50000"/>
+                </a:schemeClr>
+              </a:lnRef>
+              <a:fillRef idx="1">
+                <a:schemeClr val="accent1"/>
+              </a:fillRef>
+              <a:effectRef idx="0">
+                <a:schemeClr val="accent1"/>
+              </a:effectRef>
+              <a:fontRef idx="minor">
+                <a:schemeClr val="lt1"/>
+              </a:fontRef>
+            </p:style>
+            <p:txBody>
+              <a:bodyPr rtlCol="0" anchor="ctr"/>
+              <a:lstStyle/>
+              <a:p>
+                <a:pPr algn="ctr"/>
+                <a:endParaRPr lang="en-US"/>
+              </a:p>
+            </p:txBody>
+          </p:sp>
+          <p:sp>
+            <p:nvSpPr>
+              <p:cNvPr id="6" name="TextBox 5"/>
+              <p:cNvSpPr txBox="1"/>
+              <p:nvPr/>
+            </p:nvSpPr>
+            <p:spPr>
+              <a:xfrm>
+                <a:off x="6656169" y="3746203"/>
+                <a:ext cx="1449862" cy="415498"/>
+              </a:xfrm>
+              <a:prstGeom prst="rect">
+                <a:avLst/>
+              </a:prstGeom>
+              <a:noFill/>
+            </p:spPr>
+            <p:txBody>
+              <a:bodyPr wrap="square" rtlCol="0">
+                <a:spAutoFit/>
+              </a:bodyPr>
+              <a:lstStyle/>
+              <a:p>
+                <a:r>
+                  <a:rPr lang="en-US" sz="1050" dirty="0" smtClean="0">
+                    <a:solidFill>
+                      <a:schemeClr val="accent1"/>
+                    </a:solidFill>
+                  </a:rPr>
+                  <a:t>New Horizons (modeled)</a:t>
+                </a:r>
+                <a:endParaRPr lang="en-US" sz="1050" dirty="0">
+                  <a:solidFill>
+                    <a:schemeClr val="accent1"/>
+                  </a:solidFill>
+                </a:endParaRPr>
+              </a:p>
+            </p:txBody>
+          </p:sp>
+        </p:grpSp>
+        <p:sp>
+          <p:nvSpPr>
+            <p:cNvPr id="14" name="TextBox 13"/>
+            <p:cNvSpPr txBox="1"/>
+            <p:nvPr/>
+          </p:nvSpPr>
+          <p:spPr>
+            <a:xfrm>
+              <a:off x="6890235" y="1977489"/>
+              <a:ext cx="1449862" cy="261610"/>
+            </a:xfrm>
+            <a:prstGeom prst="rect">
+              <a:avLst/>
+            </a:prstGeom>
+            <a:noFill/>
+          </p:spPr>
+          <p:txBody>
+            <a:bodyPr wrap="square" rtlCol="0">
+              <a:spAutoFit/>
+            </a:bodyPr>
+            <a:lstStyle/>
+            <a:p>
+              <a:r>
+                <a:rPr lang="en-US" sz="1050" dirty="0" smtClean="0">
+                  <a:solidFill>
+                    <a:schemeClr val="accent1"/>
+                  </a:solidFill>
+                </a:rPr>
+                <a:t>Voyager 1 (so far)</a:t>
+              </a:r>
+              <a:endParaRPr lang="en-US" sz="1050" dirty="0">
+                <a:solidFill>
+                  <a:schemeClr val="accent1"/>
+                </a:solidFill>
+              </a:endParaRPr>
+            </a:p>
+          </p:txBody>
+        </p:sp>
+        <p:sp>
+          <p:nvSpPr>
+            <p:cNvPr id="15" name="Flowchart: Off-page Connector 14"/>
+            <p:cNvSpPr/>
+            <p:nvPr/>
+          </p:nvSpPr>
+          <p:spPr>
+            <a:xfrm rot="10800000">
+              <a:off x="6843583" y="2038810"/>
+              <a:ext cx="93305" cy="100868"/>
+            </a:xfrm>
+            <a:prstGeom prst="flowChartOffpageConnector">
+              <a:avLst/>
+            </a:prstGeom>
+          </p:spPr>
+          <p:style>
+            <a:lnRef idx="2">
+              <a:schemeClr val="accent1">
+                <a:shade val="50000"/>
+              </a:schemeClr>
+            </a:lnRef>
+            <a:fillRef idx="1">
+              <a:schemeClr val="accent1"/>
+            </a:fillRef>
+            <a:effectRef idx="0">
+              <a:schemeClr val="accent1"/>
+            </a:effectRef>
+            <a:fontRef idx="minor">
+              <a:schemeClr val="lt1"/>
+            </a:fontRef>
+          </p:style>
+          <p:txBody>
+            <a:bodyPr rtlCol="0" anchor="ctr"/>
+            <a:lstStyle/>
+            <a:p>
+              <a:pPr algn="ctr"/>
+              <a:endParaRPr lang="en-US"/>
+            </a:p>
+          </p:txBody>
+        </p:sp>
+        <p:grpSp>
+          <p:nvGrpSpPr>
+            <p:cNvPr id="16" name="Group 15"/>
+            <p:cNvGrpSpPr/>
+            <p:nvPr/>
+          </p:nvGrpSpPr>
+          <p:grpSpPr>
+            <a:xfrm>
+              <a:off x="7862758" y="2792342"/>
+              <a:ext cx="1688758" cy="415498"/>
+              <a:chOff x="6614983" y="3746203"/>
+              <a:chExt cx="1491048" cy="415498"/>
+            </a:xfrm>
+          </p:grpSpPr>
+          <p:sp>
+            <p:nvSpPr>
+              <p:cNvPr id="17" name="Flowchart: Off-page Connector 16"/>
+              <p:cNvSpPr/>
+              <p:nvPr/>
+            </p:nvSpPr>
+            <p:spPr>
+              <a:xfrm>
+                <a:off x="6614983" y="3828583"/>
+                <a:ext cx="82381" cy="100868"/>
+              </a:xfrm>
+              <a:prstGeom prst="flowChartOffpageConnector">
+                <a:avLst/>
+              </a:prstGeom>
+            </p:spPr>
+            <p:style>
+              <a:lnRef idx="2">
+                <a:schemeClr val="accent1">
+                  <a:shade val="50000"/>
+                </a:schemeClr>
+              </a:lnRef>
+              <a:fillRef idx="1">
+                <a:schemeClr val="accent1"/>
+              </a:fillRef>
+              <a:effectRef idx="0">
+                <a:schemeClr val="accent1"/>
+              </a:effectRef>
+              <a:fontRef idx="minor">
+                <a:schemeClr val="lt1"/>
+              </a:fontRef>
+            </p:style>
+            <p:txBody>
+              <a:bodyPr rtlCol="0" anchor="ctr"/>
+              <a:lstStyle/>
+              <a:p>
+                <a:pPr algn="ctr"/>
+                <a:endParaRPr lang="en-US"/>
+              </a:p>
+            </p:txBody>
+          </p:sp>
+          <p:sp>
+            <p:nvSpPr>
+              <p:cNvPr id="18" name="TextBox 17"/>
+              <p:cNvSpPr txBox="1"/>
+              <p:nvPr/>
+            </p:nvSpPr>
+            <p:spPr>
+              <a:xfrm>
+                <a:off x="6656169" y="3746203"/>
+                <a:ext cx="1449862" cy="415498"/>
+              </a:xfrm>
+              <a:prstGeom prst="rect">
+                <a:avLst/>
+              </a:prstGeom>
+              <a:noFill/>
+            </p:spPr>
+            <p:txBody>
+              <a:bodyPr wrap="square" rtlCol="0">
+                <a:spAutoFit/>
+              </a:bodyPr>
+              <a:lstStyle/>
+              <a:p>
+                <a:r>
+                  <a:rPr lang="en-US" sz="1050" dirty="0" smtClean="0">
+                    <a:solidFill>
+                      <a:schemeClr val="accent1"/>
+                    </a:solidFill>
+                  </a:rPr>
+                  <a:t>Alpha Centauri B Orbit (theoretical)</a:t>
+                </a:r>
+                <a:endParaRPr lang="en-US" sz="1050" dirty="0">
+                  <a:solidFill>
+                    <a:schemeClr val="accent1"/>
+                  </a:solidFill>
+                </a:endParaRPr>
+              </a:p>
+            </p:txBody>
+          </p:sp>
+        </p:grpSp>
+      </p:grpSp>
+    </p:spTree>
+    <p:extLst>
+      <p:ext uri="{BB962C8B-B14F-4D97-AF65-F5344CB8AC3E}">
+        <p14:creationId xmlns:p14="http://schemas.microsoft.com/office/powerpoint/2010/main" val="1991821810"/>
+      </p:ext>
+    </p:extLst>
+  </p:cSld>
+  <p:clrMapOvr>
+    <a:masterClrMapping/>
+  </p:clrMapOvr>
+  <p:timing>
+    <p:tnLst>
+      <p:par>
+        <p:cTn id="1" dur="indefinite" restart="never" nodeType="tmRoot"/>
+      </p:par>
+    </p:tnLst>
+  </p:timing>
+</p:sld>
+</file>
+
 <file path=ppt/slides/slide2.xml><?xml version="1.0" encoding="utf-8"?>
 <p:sld xmlns:a="http://schemas.openxmlformats.org/drawingml/2006/main" xmlns:r="http://schemas.openxmlformats.org/officeDocument/2006/relationships" xmlns:p="http://schemas.openxmlformats.org/presentationml/2006/main">
   <p:cSld>
@@ -3993,35 +4673,158 @@
             <p:ph type="title"/>
           </p:nvPr>
         </p:nvSpPr>
+        <p:spPr/>
+        <p:txBody>
+          <a:bodyPr/>
+          <a:lstStyle/>
+          <a:p>
+            <a:r>
+              <a:rPr lang="en-US" dirty="0" smtClean="0"/>
+              <a:t>Our System</a:t>
+            </a:r>
+            <a:endParaRPr lang="en-US" dirty="0"/>
+          </a:p>
+        </p:txBody>
+      </p:sp>
+      <p:pic>
+        <p:nvPicPr>
+          <p:cNvPr id="8" name="Picture 7"/>
+          <p:cNvPicPr>
+            <a:picLocks noChangeAspect="1"/>
+          </p:cNvPicPr>
+          <p:nvPr/>
+        </p:nvPicPr>
+        <p:blipFill>
+          <a:blip r:embed="rId2"/>
+          <a:stretch>
+            <a:fillRect/>
+          </a:stretch>
+        </p:blipFill>
         <p:spPr>
           <a:xfrm>
-            <a:off x="970006" y="1740843"/>
-            <a:ext cx="10515600" cy="1325563"/>
+            <a:off x="3024371" y="1819682"/>
+            <a:ext cx="5945546" cy="4058910"/>
           </a:xfrm>
-          <a:ln w="28575">
-            <a:solidFill>
-              <a:schemeClr val="tx1"/>
-            </a:solidFill>
+          <a:prstGeom prst="rect">
+            <a:avLst/>
+          </a:prstGeom>
+        </p:spPr>
+      </p:pic>
+      <p:sp>
+        <p:nvSpPr>
+          <p:cNvPr id="3" name="TextBox 2"/>
+          <p:cNvSpPr txBox="1"/>
+          <p:nvPr/>
+        </p:nvSpPr>
+        <p:spPr>
+          <a:xfrm>
+            <a:off x="1097279" y="2734962"/>
+            <a:ext cx="2255521" cy="369332"/>
+          </a:xfrm>
+          <a:prstGeom prst="rect">
+            <a:avLst/>
+          </a:prstGeom>
+          <a:noFill/>
+        </p:spPr>
+        <p:txBody>
+          <a:bodyPr wrap="square" rtlCol="0">
+            <a:spAutoFit/>
+          </a:bodyPr>
+          <a:lstStyle/>
+          <a:p>
+            <a:r>
+              <a:rPr lang="en-US" dirty="0" smtClean="0">
+                <a:solidFill>
+                  <a:schemeClr val="accent1"/>
+                </a:solidFill>
+              </a:rPr>
+              <a:t>Really expensive stuff</a:t>
+            </a:r>
+            <a:endParaRPr lang="en-US" dirty="0">
+              <a:solidFill>
+                <a:schemeClr val="accent1"/>
+              </a:solidFill>
+            </a:endParaRPr>
+          </a:p>
+        </p:txBody>
+      </p:sp>
+      <p:cxnSp>
+        <p:nvCxnSpPr>
+          <p:cNvPr id="5" name="Straight Arrow Connector 4"/>
+          <p:cNvCxnSpPr>
+            <a:stCxn id="3" idx="2"/>
+          </p:cNvCxnSpPr>
+          <p:nvPr/>
+        </p:nvCxnSpPr>
+        <p:spPr>
+          <a:xfrm>
+            <a:off x="2225040" y="3104294"/>
+            <a:ext cx="2050398" cy="479165"/>
+          </a:xfrm>
+          <a:prstGeom prst="straightConnector1">
+            <a:avLst/>
+          </a:prstGeom>
+          <a:ln>
+            <a:tailEnd type="triangle"/>
           </a:ln>
         </p:spPr>
-        <p:txBody>
-          <a:bodyPr>
-            <a:normAutofit fontScale="90000"/>
+        <p:style>
+          <a:lnRef idx="1">
+            <a:schemeClr val="accent1"/>
+          </a:lnRef>
+          <a:fillRef idx="0">
+            <a:schemeClr val="accent1"/>
+          </a:fillRef>
+          <a:effectRef idx="0">
+            <a:schemeClr val="accent1"/>
+          </a:effectRef>
+          <a:fontRef idx="minor">
+            <a:schemeClr val="tx1"/>
+          </a:fontRef>
+        </p:style>
+      </p:cxnSp>
+      <p:sp>
+        <p:nvSpPr>
+          <p:cNvPr id="6" name="TextBox 5"/>
+          <p:cNvSpPr txBox="1"/>
+          <p:nvPr/>
+        </p:nvSpPr>
+        <p:spPr>
+          <a:xfrm>
+            <a:off x="9557538" y="3849137"/>
+            <a:ext cx="1968844" cy="646331"/>
+          </a:xfrm>
+          <a:prstGeom prst="rect">
+            <a:avLst/>
+          </a:prstGeom>
+          <a:noFill/>
+        </p:spPr>
+        <p:txBody>
+          <a:bodyPr wrap="square" rtlCol="0">
+            <a:spAutoFit/>
           </a:bodyPr>
           <a:lstStyle/>
           <a:p>
-            <a:pPr algn="ctr"/>
-            <a:r>
-              <a:rPr lang="en-US" dirty="0"/>
-              <a:t>How little plutonium can we use for a given power and mission length?</a:t>
-            </a:r>
+            <a:r>
+              <a:rPr lang="en-US" dirty="0" smtClean="0">
+                <a:solidFill>
+                  <a:schemeClr val="accent2"/>
+                </a:solidFill>
+              </a:rPr>
+              <a:t>Also really dangerous.</a:t>
+            </a:r>
+            <a:endParaRPr lang="en-US" dirty="0">
+              <a:solidFill>
+                <a:schemeClr val="accent2"/>
+              </a:solidFill>
+            </a:endParaRPr>
           </a:p>
         </p:txBody>
       </p:sp>
     </p:spTree>
     <p:extLst>
       <p:ext uri="{BB962C8B-B14F-4D97-AF65-F5344CB8AC3E}">
-        <p14:creationId xmlns:p14="http://schemas.microsoft.com/office/powerpoint/2010/main" val="3269548198"/>
+        <p14:creationId xmlns:p14="http://schemas.microsoft.com/office/powerpoint/2010/main" val="215574389"/>
       </p:ext>
     </p:extLst>
   </p:cSld>
@@ -4065,6 +4868,78 @@
             <p:ph type="title"/>
           </p:nvPr>
         </p:nvSpPr>
+        <p:spPr>
+          <a:xfrm>
+            <a:off x="970006" y="1740843"/>
+            <a:ext cx="10515600" cy="1325563"/>
+          </a:xfrm>
+          <a:ln w="28575">
+            <a:solidFill>
+              <a:schemeClr val="accent1"/>
+            </a:solidFill>
+          </a:ln>
+        </p:spPr>
+        <p:txBody>
+          <a:bodyPr>
+            <a:normAutofit fontScale="90000"/>
+          </a:bodyPr>
+          <a:lstStyle/>
+          <a:p>
+            <a:pPr algn="ctr"/>
+            <a:r>
+              <a:rPr lang="en-US" dirty="0"/>
+              <a:t>How little plutonium can we use for a given power and mission length?</a:t>
+            </a:r>
+          </a:p>
+        </p:txBody>
+      </p:sp>
+    </p:spTree>
+    <p:extLst>
+      <p:ext uri="{BB962C8B-B14F-4D97-AF65-F5344CB8AC3E}">
+        <p14:creationId xmlns:p14="http://schemas.microsoft.com/office/powerpoint/2010/main" val="3269548198"/>
+      </p:ext>
+    </p:extLst>
+  </p:cSld>
+  <p:clrMapOvr>
+    <a:masterClrMapping/>
+  </p:clrMapOvr>
+  <p:timing>
+    <p:tnLst>
+      <p:par>
+        <p:cTn id="1" dur="indefinite" restart="never" nodeType="tmRoot"/>
+      </p:par>
+    </p:tnLst>
+  </p:timing>
+</p:sld>
+</file>
+
+<file path=ppt/slides/slide5.xml><?xml version="1.0" encoding="utf-8"?>
+<p:sld xmlns:a="http://schemas.openxmlformats.org/drawingml/2006/main" xmlns:r="http://schemas.openxmlformats.org/officeDocument/2006/relationships" xmlns:p="http://schemas.openxmlformats.org/presentationml/2006/main">
+  <p:cSld>
+    <p:spTree>
+      <p:nvGrpSpPr>
+        <p:cNvPr id="1" name=""/>
+        <p:cNvGrpSpPr/>
+        <p:nvPr/>
+      </p:nvGrpSpPr>
+      <p:grpSpPr>
+        <a:xfrm>
+          <a:off x="0" y="0"/>
+          <a:ext cx="0" cy="0"/>
+          <a:chOff x="0" y="0"/>
+          <a:chExt cx="0" cy="0"/>
+        </a:xfrm>
+      </p:grpSpPr>
+      <p:sp>
+        <p:nvSpPr>
+          <p:cNvPr id="2" name="Title 1"/>
+          <p:cNvSpPr>
+            <a:spLocks noGrp="1"/>
+          </p:cNvSpPr>
+          <p:nvPr>
+            <p:ph type="title"/>
+          </p:nvPr>
+        </p:nvSpPr>
         <p:spPr/>
         <p:txBody>
           <a:bodyPr/>
@@ -4072,6 +4947,154 @@
           <a:p>
             <a:r>
               <a:rPr lang="en-US" dirty="0" smtClean="0"/>
+              <a:t>Our Key Assumptions</a:t>
+            </a:r>
+            <a:endParaRPr lang="en-US" dirty="0"/>
+          </a:p>
+        </p:txBody>
+      </p:sp>
+      <p:sp>
+        <p:nvSpPr>
+          <p:cNvPr id="3" name="Content Placeholder 2"/>
+          <p:cNvSpPr>
+            <a:spLocks noGrp="1"/>
+          </p:cNvSpPr>
+          <p:nvPr>
+            <p:ph idx="1"/>
+          </p:nvPr>
+        </p:nvSpPr>
+        <p:spPr/>
+        <p:txBody>
+          <a:bodyPr>
+            <a:normAutofit/>
+          </a:bodyPr>
+          <a:lstStyle/>
+          <a:p>
+            <a:pPr>
+              <a:lnSpc>
+                <a:spcPct val="150000"/>
+              </a:lnSpc>
+              <a:buFont typeface="Wingdings" panose="05000000000000000000" pitchFamily="2" charset="2"/>
+              <a:buChar char="§"/>
+            </a:pPr>
+            <a:r>
+              <a:rPr lang="en-US" sz="2400" dirty="0" smtClean="0"/>
+              <a:t> The RTG can be modeled as a cylinder of plutonium</a:t>
+            </a:r>
+          </a:p>
+          <a:p>
+            <a:pPr>
+              <a:lnSpc>
+                <a:spcPct val="150000"/>
+              </a:lnSpc>
+              <a:buFont typeface="Wingdings" panose="05000000000000000000" pitchFamily="2" charset="2"/>
+              <a:buChar char="§"/>
+            </a:pPr>
+            <a:r>
+              <a:rPr lang="en-US" sz="2400" dirty="0"/>
+              <a:t> </a:t>
+            </a:r>
+            <a:r>
+              <a:rPr lang="en-US" sz="2400" dirty="0" smtClean="0"/>
+              <a:t>The only way energy enters the system is by radioactive decay</a:t>
+            </a:r>
+          </a:p>
+          <a:p>
+            <a:pPr>
+              <a:lnSpc>
+                <a:spcPct val="150000"/>
+              </a:lnSpc>
+              <a:buFont typeface="Wingdings" panose="05000000000000000000" pitchFamily="2" charset="2"/>
+              <a:buChar char="§"/>
+            </a:pPr>
+            <a:r>
+              <a:rPr lang="en-US" sz="2400" dirty="0" smtClean="0"/>
+              <a:t> The only ways energy leaves the system are by radiation or as electrical power</a:t>
+            </a:r>
+          </a:p>
+          <a:p>
+            <a:pPr>
+              <a:lnSpc>
+                <a:spcPct val="150000"/>
+              </a:lnSpc>
+              <a:buFont typeface="Wingdings" panose="05000000000000000000" pitchFamily="2" charset="2"/>
+              <a:buChar char="§"/>
+            </a:pPr>
+            <a:r>
+              <a:rPr lang="en-US" sz="2400" dirty="0"/>
+              <a:t> </a:t>
+            </a:r>
+            <a:r>
+              <a:rPr lang="en-US" sz="2400" dirty="0" smtClean="0"/>
+              <a:t>Electrical power is 6% of the radiation flow</a:t>
+            </a:r>
+          </a:p>
+          <a:p>
+            <a:pPr>
+              <a:lnSpc>
+                <a:spcPct val="150000"/>
+              </a:lnSpc>
+              <a:buFont typeface="Wingdings" panose="05000000000000000000" pitchFamily="2" charset="2"/>
+              <a:buChar char="§"/>
+            </a:pPr>
+            <a:r>
+              <a:rPr lang="en-US" sz="2400" dirty="0"/>
+              <a:t> </a:t>
+            </a:r>
+            <a:r>
+              <a:rPr lang="en-US" sz="2400" dirty="0" smtClean="0"/>
+              <a:t>The temperature of space is a constant 2 Kelvin</a:t>
+            </a:r>
+          </a:p>
+        </p:txBody>
+      </p:sp>
+    </p:spTree>
+    <p:extLst>
+      <p:ext uri="{BB962C8B-B14F-4D97-AF65-F5344CB8AC3E}">
+        <p14:creationId xmlns:p14="http://schemas.microsoft.com/office/powerpoint/2010/main" val="3567612858"/>
+      </p:ext>
+    </p:extLst>
+  </p:cSld>
+  <p:clrMapOvr>
+    <a:masterClrMapping/>
+  </p:clrMapOvr>
+</p:sld>
+</file>
+
+<file path=ppt/slides/slide6.xml><?xml version="1.0" encoding="utf-8"?>
+<p:sld xmlns:a="http://schemas.openxmlformats.org/drawingml/2006/main" xmlns:r="http://schemas.openxmlformats.org/officeDocument/2006/relationships" xmlns:p="http://schemas.openxmlformats.org/presentationml/2006/main">
+  <p:cSld>
+    <p:spTree>
+      <p:nvGrpSpPr>
+        <p:cNvPr id="1" name=""/>
+        <p:cNvGrpSpPr/>
+        <p:nvPr/>
+      </p:nvGrpSpPr>
+      <p:grpSpPr>
+        <a:xfrm>
+          <a:off x="0" y="0"/>
+          <a:ext cx="0" cy="0"/>
+          <a:chOff x="0" y="0"/>
+          <a:chExt cx="0" cy="0"/>
+        </a:xfrm>
+      </p:grpSpPr>
+      <p:sp>
+        <p:nvSpPr>
+          <p:cNvPr id="2" name="Title 1"/>
+          <p:cNvSpPr>
+            <a:spLocks noGrp="1"/>
+          </p:cNvSpPr>
+          <p:nvPr>
+            <p:ph type="title"/>
+          </p:nvPr>
+        </p:nvSpPr>
+        <p:spPr/>
+        <p:txBody>
+          <a:bodyPr/>
+          <a:lstStyle/>
+          <a:p>
+            <a:r>
+              <a:rPr lang="en-US" dirty="0" smtClean="0"/>
               <a:t>Our Model</a:t>
             </a:r>
             <a:endParaRPr lang="en-US" dirty="0"/>
@@ -4080,40 +5103,106 @@
       </p:sp>
       <p:pic>
         <p:nvPicPr>
-          <p:cNvPr id="12" name="Picture 11"/>
+          <p:cNvPr id="5" name="Picture 4"/>
           <p:cNvPicPr>
             <a:picLocks noChangeAspect="1"/>
           </p:cNvPicPr>
           <p:nvPr/>
         </p:nvPicPr>
         <p:blipFill>
-          <a:blip r:embed="rId2"/>
+          <a:blip r:embed="rId2">
+            <a:extLst>
+              <a:ext uri="{28A0092B-C50C-407E-A947-70E740481C1C}">
+                <a14:useLocalDpi xmlns:a14="http://schemas.microsoft.com/office/drawing/2010/main" val="0"/>
+              </a:ext>
+            </a:extLst>
+          </a:blip>
           <a:stretch>
             <a:fillRect/>
           </a:stretch>
         </p:blipFill>
         <p:spPr>
           <a:xfrm>
-            <a:off x="180934" y="1737360"/>
-            <a:ext cx="5945546" cy="8230484"/>
+            <a:off x="2513928" y="1762074"/>
+            <a:ext cx="7225103" cy="4562303"/>
           </a:xfrm>
           <a:prstGeom prst="rect">
             <a:avLst/>
           </a:prstGeom>
         </p:spPr>
       </p:pic>
-      <mc:AlternateContent xmlns:mc="http://schemas.openxmlformats.org/markup-compatibility/2006" xmlns:a14="http://schemas.microsoft.com/office/drawing/2010/main">
-        <mc:Choice Requires="a14">
+    </p:spTree>
+    <p:extLst>
+      <p:ext uri="{BB962C8B-B14F-4D97-AF65-F5344CB8AC3E}">
+        <p14:creationId xmlns:p14="http://schemas.microsoft.com/office/powerpoint/2010/main" val="1857006999"/>
+      </p:ext>
+    </p:extLst>
+  </p:cSld>
+  <p:clrMapOvr>
+    <a:masterClrMapping/>
+  </p:clrMapOvr>
+  <p:timing>
+    <p:tnLst>
+      <p:par>
+        <p:cTn id="1" dur="indefinite" restart="never" nodeType="tmRoot"/>
+      </p:par>
+    </p:tnLst>
+  </p:timing>
+</p:sld>
+</file>
+
+<file path=ppt/slides/slide7.xml><?xml version="1.0" encoding="utf-8"?>
+<p:sld xmlns:a="http://schemas.openxmlformats.org/drawingml/2006/main" xmlns:r="http://schemas.openxmlformats.org/officeDocument/2006/relationships" xmlns:p="http://schemas.openxmlformats.org/presentationml/2006/main">
+  <p:cSld>
+    <p:spTree>
+      <p:nvGrpSpPr>
+        <p:cNvPr id="1" name=""/>
+        <p:cNvGrpSpPr/>
+        <p:nvPr/>
+      </p:nvGrpSpPr>
+      <p:grpSpPr>
+        <a:xfrm>
+          <a:off x="0" y="0"/>
+          <a:ext cx="0" cy="0"/>
+          <a:chOff x="0" y="0"/>
+          <a:chExt cx="0" cy="0"/>
+        </a:xfrm>
+      </p:grpSpPr>
+      <p:sp>
+        <p:nvSpPr>
+          <p:cNvPr id="2" name="Title 1"/>
+          <p:cNvSpPr>
+            <a:spLocks noGrp="1"/>
+          </p:cNvSpPr>
+          <p:nvPr>
+            <p:ph type="title"/>
+          </p:nvPr>
+        </p:nvSpPr>
+        <p:spPr/>
+        <p:txBody>
+          <a:bodyPr/>
+          <a:lstStyle/>
+          <a:p>
+            <a:r>
+              <a:rPr lang="en-US" dirty="0" smtClean="0"/>
+              <a:t>Our Differential Equations</a:t>
+            </a:r>
+            <a:endParaRPr lang="en-US" dirty="0"/>
+          </a:p>
+        </p:txBody>
+      </p:sp>
+      <mc:AlternateContent xmlns:mc="http://schemas.openxmlformats.org/markup-compatibility/2006">
+        <mc:Choice xmlns:a14="http://schemas.microsoft.com/office/drawing/2010/main" Requires="a14">
           <p:sp>
             <p:nvSpPr>
-              <p:cNvPr id="3" name="Rectangle 2"/>
+              <p:cNvPr id="5" name="Rectangle 4"/>
               <p:cNvSpPr/>
               <p:nvPr/>
             </p:nvSpPr>
             <p:spPr>
               <a:xfrm>
-                <a:off x="4958876" y="2679807"/>
-                <a:ext cx="8427308" cy="1562094"/>
+                <a:off x="-314942" y="3935924"/>
+                <a:ext cx="12882844" cy="1163139"/>
               </a:xfrm>
               <a:prstGeom prst="rect">
                 <a:avLst/>
@@ -4404,31 +5493,6 @@
                           </m:r>
                         </m:sup>
                       </m:sSup>
-                    </m:oMath>
-                  </m:oMathPara>
-                </a14:m>
-                <a:endParaRPr lang="en-US" i="1" dirty="0" smtClean="0">
-                  <a:effectLst/>
-                  <a:latin typeface="Cambria Math" panose="02040503050406030204" pitchFamily="18" charset="0"/>
-                  <a:ea typeface="STKaiti"/>
-                  <a:cs typeface="Tahoma" panose="020B0604030504040204" pitchFamily="34" charset="0"/>
-                </a:endParaRPr>
-              </a:p>
-              <a:p>
-                <a:pPr>
-                  <a:lnSpc>
-                    <a:spcPct val="107000"/>
-                  </a:lnSpc>
-                  <a:spcAft>
-                    <a:spcPts val="800"/>
-                  </a:spcAft>
-                </a:pPr>
-                <a14:m>
-                  <m:oMathPara xmlns:m="http://schemas.openxmlformats.org/officeDocument/2006/math">
-                    <m:oMathParaPr>
-                      <m:jc m:val="centerGroup"/>
-                    </m:oMathParaPr>
-                    <m:oMath xmlns:m="http://schemas.openxmlformats.org/officeDocument/2006/math">
                       <m:r>
                         <a:rPr lang="en-US" i="1">
                           <a:effectLst/>
@@ -4559,9 +5623,9 @@
                     </m:oMath>
                   </m:oMathPara>
                 </a14:m>
-                <a:endParaRPr lang="en-US" sz="1600" dirty="0">
+                <a:endParaRPr lang="en-US" i="1" dirty="0" smtClean="0">
                   <a:effectLst/>
-                  <a:latin typeface="Candara" panose="020E0502030303020204" pitchFamily="34" charset="0"/>
+                  <a:latin typeface="Cambria Math" panose="02040503050406030204" pitchFamily="18" charset="0"/>
                   <a:ea typeface="STKaiti"/>
                   <a:cs typeface="Tahoma" panose="020B0604030504040204" pitchFamily="34" charset="0"/>
                 </a:endParaRPr>
@@ -4704,12 +5768,12 @@
                               <a:ea typeface="STKaiti"/>
                               <a:cs typeface="Tahoma" panose="020B0604030504040204" pitchFamily="34" charset="0"/>
                             </a:rPr>
-                            <m:t>10)</m:t>
+                            <m:t>10</m:t>
                           </m:r>
                         </m:e>
                         <m:sup>
                           <m:r>
-                            <a:rPr lang="en-US" i="1">
+                            <a:rPr lang="en-US" i="1" smtClean="0">
                               <a:effectLst/>
                               <a:latin typeface="Cambria Math" panose="02040503050406030204" pitchFamily="18" charset="0"/>
                               <a:ea typeface="STKaiti"/>
@@ -4719,6 +5783,15 @@
                           </m:r>
                         </m:sup>
                       </m:sSup>
+                      <m:r>
+                        <a:rPr lang="en-US" b="0" i="1" smtClean="0">
+                          <a:effectLst/>
+                          <a:latin typeface="Cambria Math" panose="02040503050406030204" pitchFamily="18" charset="0"/>
+                          <a:ea typeface="STKaiti"/>
+                          <a:cs typeface="Tahoma" panose="020B0604030504040204" pitchFamily="34" charset="0"/>
+                        </a:rPr>
+                        <m:t>)</m:t>
+                      </m:r>
                       <m:r>
                         <a:rPr lang="en-US" i="1">
                           <a:effectLst/>
@@ -4847,10 +5920,10 @@
             </p:txBody>
           </p:sp>
         </mc:Choice>
-        <mc:Fallback xmlns="">
+        <mc:Fallback>
           <p:sp>
             <p:nvSpPr>
-              <p:cNvPr id="3" name="Rectangle 2"/>
+              <p:cNvPr id="5" name="Rectangle 4"/>
               <p:cNvSpPr>
                 <a:spLocks noRot="1" noChangeAspect="1" noMove="1" noResize="1" noEditPoints="1" noAdjustHandles="1" noChangeArrowheads="1" noChangeShapeType="1" noTextEdit="1"/>
               </p:cNvSpPr>
@@ -4858,14 +5931,14 @@
             </p:nvSpPr>
             <p:spPr>
               <a:xfrm>
-                <a:off x="4958876" y="2679807"/>
-                <a:ext cx="8427308" cy="1562094"/>
+                <a:off x="-314942" y="3935924"/>
+                <a:ext cx="12882844" cy="1163139"/>
               </a:xfrm>
               <a:prstGeom prst="rect">
                 <a:avLst/>
               </a:prstGeom>
               <a:blipFill rotWithShape="0">
-                <a:blip r:embed="rId3"/>
+                <a:blip r:embed="rId2"/>
                 <a:stretch>
                   <a:fillRect/>
                 </a:stretch>
@@ -4886,17 +5959,17 @@
           </p:sp>
         </mc:Fallback>
       </mc:AlternateContent>
-      <mc:AlternateContent xmlns:mc="http://schemas.openxmlformats.org/markup-compatibility/2006" xmlns:a14="http://schemas.microsoft.com/office/drawing/2010/main">
-        <mc:Choice Requires="a14">
+      <mc:AlternateContent xmlns:mc="http://schemas.openxmlformats.org/markup-compatibility/2006">
+        <mc:Choice xmlns:a14="http://schemas.microsoft.com/office/drawing/2010/main" Requires="a14">
           <p:sp>
             <p:nvSpPr>
-              <p:cNvPr id="4" name="Rectangle 3"/>
+              <p:cNvPr id="6" name="Rectangle 5"/>
               <p:cNvSpPr/>
               <p:nvPr/>
             </p:nvSpPr>
             <p:spPr>
               <a:xfrm>
-                <a:off x="6674212" y="4488061"/>
+                <a:off x="4368018" y="2683747"/>
                 <a:ext cx="3516924" cy="808298"/>
               </a:xfrm>
               <a:prstGeom prst="rect">
@@ -5100,10 +6173,10 @@
             </p:txBody>
           </p:sp>
         </mc:Choice>
-        <mc:Fallback xmlns="">
+        <mc:Fallback>
           <p:sp>
             <p:nvSpPr>
-              <p:cNvPr id="4" name="Rectangle 3"/>
+              <p:cNvPr id="6" name="Rectangle 5"/>
               <p:cNvSpPr>
                 <a:spLocks noRot="1" noChangeAspect="1" noMove="1" noResize="1" noEditPoints="1" noAdjustHandles="1" noChangeArrowheads="1" noChangeShapeType="1" noTextEdit="1"/>
               </p:cNvSpPr>
@@ -5111,14 +6184,14 @@
             </p:nvSpPr>
             <p:spPr>
               <a:xfrm>
-                <a:off x="6674212" y="4488061"/>
+                <a:off x="4368018" y="2683747"/>
                 <a:ext cx="3516924" cy="808298"/>
               </a:xfrm>
               <a:prstGeom prst="rect">
                 <a:avLst/>
               </a:prstGeom>
               <a:blipFill rotWithShape="0">
-                <a:blip r:embed="rId4"/>
+                <a:blip r:embed="rId3"/>
                 <a:stretch>
                   <a:fillRect/>
                 </a:stretch>
@@ -5142,24 +6215,17 @@
     </p:spTree>
     <p:extLst>
       <p:ext uri="{BB962C8B-B14F-4D97-AF65-F5344CB8AC3E}">
-        <p14:creationId xmlns:p14="http://schemas.microsoft.com/office/powerpoint/2010/main" val="1857006999"/>
+        <p14:creationId xmlns:p14="http://schemas.microsoft.com/office/powerpoint/2010/main" val="446545051"/>
       </p:ext>
     </p:extLst>
   </p:cSld>
   <p:clrMapOvr>
     <a:masterClrMapping/>
   </p:clrMapOvr>
-  <p:timing>
-    <p:tnLst>
-      <p:par>
-        <p:cTn id="1" dur="indefinite" restart="never" nodeType="tmRoot"/>
-      </p:par>
-    </p:tnLst>
-  </p:timing>
 </p:sld>
 </file>
 
-<file path=ppt/slides/slide5.xml><?xml version="1.0" encoding="utf-8"?>
+<file path=ppt/slides/slide8.xml><?xml version="1.0" encoding="utf-8"?>
 <p:sld xmlns:a="http://schemas.openxmlformats.org/drawingml/2006/main" xmlns:r="http://schemas.openxmlformats.org/officeDocument/2006/relationships" xmlns:p="http://schemas.openxmlformats.org/presentationml/2006/main">
   <p:cSld>
     <p:spTree>
@@ -5193,7 +6259,11 @@
           <a:p>
             <a:r>
               <a:rPr lang="en-US" dirty="0" smtClean="0"/>
-              <a:t>Our Results</a:t>
+              <a:t>Our </a:t>
+            </a:r>
+            <a:r>
+              <a:rPr lang="en-US" dirty="0" smtClean="0"/>
+              <a:t>Simulation</a:t>
             </a:r>
             <a:endParaRPr lang="en-US" dirty="0"/>
           </a:p>
@@ -5201,7 +6271,7 @@
       </p:sp>
       <p:pic>
         <p:nvPicPr>
-          <p:cNvPr id="4" name="Picture 3"/>
+          <p:cNvPr id="3" name="Picture 2"/>
           <p:cNvPicPr>
             <a:picLocks noChangeAspect="1"/>
           </p:cNvPicPr>
@@ -5215,44 +6285,107 @@
         </p:blipFill>
         <p:spPr>
           <a:xfrm>
-            <a:off x="1097280" y="1984496"/>
-            <a:ext cx="5270718" cy="3954985"/>
+            <a:off x="358719" y="2394999"/>
+            <a:ext cx="3966143" cy="2976073"/>
           </a:xfrm>
           <a:prstGeom prst="rect">
             <a:avLst/>
           </a:prstGeom>
         </p:spPr>
       </p:pic>
-      <p:sp>
-        <p:nvSpPr>
-          <p:cNvPr id="5" name="TextBox 4"/>
-          <p:cNvSpPr txBox="1"/>
+      <p:pic>
+        <p:nvPicPr>
+          <p:cNvPr id="6" name="Picture 5"/>
+          <p:cNvPicPr>
+            <a:picLocks noChangeAspect="1"/>
+          </p:cNvPicPr>
           <p:nvPr/>
-        </p:nvSpPr>
+        </p:nvPicPr>
+        <p:blipFill>
+          <a:blip r:embed="rId3"/>
+          <a:stretch>
+            <a:fillRect/>
+          </a:stretch>
+        </p:blipFill>
         <p:spPr>
           <a:xfrm>
-            <a:off x="1911177" y="4893909"/>
-            <a:ext cx="1927655" cy="261610"/>
+            <a:off x="4143408" y="2394999"/>
+            <a:ext cx="3966144" cy="2976072"/>
           </a:xfrm>
           <a:prstGeom prst="rect">
             <a:avLst/>
           </a:prstGeom>
-          <a:noFill/>
         </p:spPr>
-        <p:txBody>
-          <a:bodyPr wrap="square" rtlCol="0">
-            <a:spAutoFit/>
-          </a:bodyPr>
-          <a:lstStyle/>
-          <a:p>
-            <a:r>
-              <a:rPr lang="en-US" sz="1100" dirty="0" smtClean="0"/>
-              <a:t>Power Threshold = 100W</a:t>
-            </a:r>
-            <a:endParaRPr lang="en-US" sz="1100" dirty="0"/>
-          </a:p>
-        </p:txBody>
-      </p:sp>
+      </p:pic>
+      <p:grpSp>
+        <p:nvGrpSpPr>
+          <p:cNvPr id="9" name="Group 8"/>
+          <p:cNvGrpSpPr/>
+          <p:nvPr/>
+        </p:nvGrpSpPr>
+        <p:grpSpPr>
+          <a:xfrm>
+            <a:off x="7931048" y="2397212"/>
+            <a:ext cx="3963193" cy="2973859"/>
+            <a:chOff x="7931048" y="2397212"/>
+            <a:chExt cx="3963193" cy="2973859"/>
+          </a:xfrm>
+        </p:grpSpPr>
+        <p:pic>
+          <p:nvPicPr>
+            <p:cNvPr id="7" name="Picture 6"/>
+            <p:cNvPicPr>
+              <a:picLocks noChangeAspect="1"/>
+            </p:cNvPicPr>
+            <p:nvPr/>
+          </p:nvPicPr>
+          <p:blipFill>
+            <a:blip r:embed="rId4"/>
+            <a:stretch>
+              <a:fillRect/>
+            </a:stretch>
+          </p:blipFill>
+          <p:spPr>
+            <a:xfrm>
+              <a:off x="7931048" y="2397212"/>
+              <a:ext cx="3963193" cy="2973859"/>
+            </a:xfrm>
+            <a:prstGeom prst="rect">
+              <a:avLst/>
+            </a:prstGeom>
+          </p:spPr>
+        </p:pic>
+        <p:sp>
+          <p:nvSpPr>
+            <p:cNvPr id="5" name="TextBox 4"/>
+            <p:cNvSpPr txBox="1"/>
+            <p:nvPr/>
+          </p:nvSpPr>
+          <p:spPr>
+            <a:xfrm>
+              <a:off x="8486244" y="3715664"/>
+              <a:ext cx="1927655" cy="261610"/>
+            </a:xfrm>
+            <a:prstGeom prst="rect">
+              <a:avLst/>
+            </a:prstGeom>
+            <a:noFill/>
+          </p:spPr>
+          <p:txBody>
+            <a:bodyPr wrap="square" rtlCol="0">
+              <a:spAutoFit/>
+            </a:bodyPr>
+            <a:lstStyle/>
+            <a:p>
+              <a:r>
+                <a:rPr lang="en-US" sz="1100" dirty="0" smtClean="0"/>
+                <a:t>Power Threshold = 100W</a:t>
+              </a:r>
+              <a:endParaRPr lang="en-US" sz="1100" dirty="0"/>
+            </a:p>
+          </p:txBody>
+        </p:sp>
+      </p:grpSp>
     </p:spTree>
     <p:extLst>
       <p:ext uri="{BB962C8B-B14F-4D97-AF65-F5344CB8AC3E}">
@@ -5273,7 +6406,7 @@
 </p:sld>
 </file>
 
-<file path=ppt/slides/slide6.xml><?xml version="1.0" encoding="utf-8"?>
+<file path=ppt/slides/slide9.xml><?xml version="1.0" encoding="utf-8"?>
 <p:sld xmlns:a="http://schemas.openxmlformats.org/drawingml/2006/main" xmlns:r="http://schemas.openxmlformats.org/officeDocument/2006/relationships" xmlns:p="http://schemas.openxmlformats.org/presentationml/2006/main">
   <p:cSld>
     <p:spTree>
@@ -5329,7 +6462,7 @@
         </p:blipFill>
         <p:spPr>
           <a:xfrm>
-            <a:off x="1097280" y="1975021"/>
+            <a:off x="1097280" y="1764956"/>
             <a:ext cx="3847923" cy="2887363"/>
           </a:xfrm>
           <a:prstGeom prst="rect">
@@ -5375,7 +6508,7 @@
         </p:nvSpPr>
         <p:spPr>
           <a:xfrm>
-            <a:off x="7586407" y="5222789"/>
+            <a:off x="8396005" y="5161523"/>
             <a:ext cx="2759675" cy="646331"/>
           </a:xfrm>
           <a:prstGeom prst="rect">
@@ -5401,45 +6534,6 @@
             <a:r>
               <a:rPr lang="en-US" dirty="0" smtClean="0"/>
               <a:t>ero?”</a:t>
-            </a:r>
-            <a:endParaRPr lang="en-US" dirty="0"/>
-          </a:p>
-        </p:txBody>
-      </p:sp>
-      <p:sp>
-        <p:nvSpPr>
-          <p:cNvPr id="8" name="TextBox 7"/>
-          <p:cNvSpPr txBox="1"/>
-          <p:nvPr/>
-        </p:nvSpPr>
-        <p:spPr>
-          <a:xfrm>
-            <a:off x="1727900" y="5182454"/>
-            <a:ext cx="2504302" cy="923330"/>
-          </a:xfrm>
-          <a:prstGeom prst="rect">
-            <a:avLst/>
-          </a:prstGeom>
-          <a:noFill/>
-        </p:spPr>
-        <p:txBody>
-          <a:bodyPr wrap="square" rtlCol="0">
-            <a:spAutoFit/>
-          </a:bodyPr>
-          <a:lstStyle/>
-          <a:p>
-            <a:pPr algn="ctr"/>
-            <a:r>
-              <a:rPr lang="en-US" dirty="0" smtClean="0"/>
-              <a:t>MATLAB: “No </a:t>
-            </a:r>
-            <a:r>
-              <a:rPr lang="en-US" dirty="0" err="1" smtClean="0"/>
-              <a:t>params</a:t>
-            </a:r>
-            <a:r>
-              <a:rPr lang="en-US" dirty="0" smtClean="0"/>
-              <a:t> defined. Perhaps Java isn’t running?”</a:t>
             </a:r>
             <a:endParaRPr lang="en-US" dirty="0"/>
           </a:p>
@@ -5519,192 +6613,13 @@
                   <a:srgbClr val="92D050"/>
                 </a:solidFill>
               </a:rPr>
-              <a:t>Silliness</a:t>
+              <a:t>Anomaly</a:t>
             </a:r>
             <a:endParaRPr lang="en-US" sz="1200" dirty="0">
               <a:solidFill>
                 <a:srgbClr val="92D050"/>
               </a:solidFill>
             </a:endParaRPr>
-          </a:p>
-        </p:txBody>
-      </p:sp>
-    </p:spTree>
-    <p:extLst>
-      <p:ext uri="{BB962C8B-B14F-4D97-AF65-F5344CB8AC3E}">
-        <p14:creationId xmlns:p14="http://schemas.microsoft.com/office/powerpoint/2010/main" val="3807853965"/>
-      </p:ext>
-    </p:extLst>
-  </p:cSld>
-  <p:clrMapOvr>
-    <a:masterClrMapping/>
-  </p:clrMapOvr>
-  <p:timing>
-    <p:tnLst>
-      <p:par>
-        <p:cTn id="1" dur="indefinite" restart="never" nodeType="tmRoot"/>
-      </p:par>
-    </p:tnLst>
-  </p:timing>
-</p:sld>
-</file>
-
-<file path=ppt/slides/slide7.xml><?xml version="1.0" encoding="utf-8"?>
-<p:sld xmlns:a="http://schemas.openxmlformats.org/drawingml/2006/main" xmlns:r="http://schemas.openxmlformats.org/officeDocument/2006/relationships" xmlns:p="http://schemas.openxmlformats.org/presentationml/2006/main">
-  <p:cSld>
-    <p:spTree>
-      <p:nvGrpSpPr>
-        <p:cNvPr id="1" name=""/>
-        <p:cNvGrpSpPr/>
-        <p:nvPr/>
-      </p:nvGrpSpPr>
-      <p:grpSpPr>
-        <a:xfrm>
-          <a:off x="0" y="0"/>
-          <a:ext cx="0" cy="0"/>
-          <a:chOff x="0" y="0"/>
-          <a:chExt cx="0" cy="0"/>
-        </a:xfrm>
-      </p:grpSpPr>
-      <p:sp>
-        <p:nvSpPr>
-          <p:cNvPr id="2" name="Title 1"/>
-          <p:cNvSpPr>
-            <a:spLocks noGrp="1"/>
-          </p:cNvSpPr>
-          <p:nvPr>
-            <p:ph type="title"/>
-          </p:nvPr>
-        </p:nvSpPr>
-        <p:spPr/>
-        <p:txBody>
-          <a:bodyPr/>
-          <a:lstStyle/>
-          <a:p>
-            <a:r>
-              <a:rPr lang="en-US" dirty="0" smtClean="0"/>
-              <a:t>Our Takeaways</a:t>
-            </a:r>
-            <a:endParaRPr lang="en-US" dirty="0"/>
-          </a:p>
-        </p:txBody>
-      </p:sp>
-      <p:sp>
-        <p:nvSpPr>
-          <p:cNvPr id="3" name="Content Placeholder 2"/>
-          <p:cNvSpPr>
-            <a:spLocks noGrp="1"/>
-          </p:cNvSpPr>
-          <p:nvPr>
-            <p:ph idx="1"/>
-          </p:nvPr>
-        </p:nvSpPr>
-        <p:spPr/>
-        <p:txBody>
-          <a:bodyPr/>
-          <a:lstStyle/>
-          <a:p>
-            <a:pPr marL="0" indent="0">
-              <a:buNone/>
-            </a:pPr>
-            <a:endParaRPr lang="en-US" dirty="0"/>
-          </a:p>
-        </p:txBody>
-      </p:sp>
-    </p:spTree>
-    <p:extLst>
-      <p:ext uri="{BB962C8B-B14F-4D97-AF65-F5344CB8AC3E}">
-        <p14:creationId xmlns:p14="http://schemas.microsoft.com/office/powerpoint/2010/main" val="11752898"/>
-      </p:ext>
-    </p:extLst>
-  </p:cSld>
-  <p:clrMapOvr>
-    <a:masterClrMapping/>
-  </p:clrMapOvr>
-  <p:timing>
-    <p:tnLst>
-      <p:par>
-        <p:cTn id="1" dur="indefinite" restart="never" nodeType="tmRoot"/>
-      </p:par>
-    </p:tnLst>
-  </p:timing>
-</p:sld>
-</file>
-
-<file path=ppt/slides/slide8.xml><?xml version="1.0" encoding="utf-8"?>
-<p:sld xmlns:a="http://schemas.openxmlformats.org/drawingml/2006/main" xmlns:r="http://schemas.openxmlformats.org/officeDocument/2006/relationships" xmlns:p="http://schemas.openxmlformats.org/presentationml/2006/main">
-  <p:cSld>
-    <p:spTree>
-      <p:nvGrpSpPr>
-        <p:cNvPr id="1" name=""/>
-        <p:cNvGrpSpPr/>
-        <p:nvPr/>
-      </p:nvGrpSpPr>
-      <p:grpSpPr>
-        <a:xfrm>
-          <a:off x="0" y="0"/>
-          <a:ext cx="0" cy="0"/>
-          <a:chOff x="0" y="0"/>
-          <a:chExt cx="0" cy="0"/>
-        </a:xfrm>
-      </p:grpSpPr>
-      <p:sp>
-        <p:nvSpPr>
-          <p:cNvPr id="2" name="Title 1"/>
-          <p:cNvSpPr>
-            <a:spLocks noGrp="1"/>
-          </p:cNvSpPr>
-          <p:nvPr>
-            <p:ph type="title"/>
-          </p:nvPr>
-        </p:nvSpPr>
-        <p:spPr/>
-        <p:txBody>
-          <a:bodyPr/>
-          <a:lstStyle/>
-          <a:p>
-            <a:r>
-              <a:rPr lang="en-US" dirty="0" smtClean="0"/>
-              <a:t>Our Design Recommendation</a:t>
-            </a:r>
-            <a:endParaRPr lang="en-US" dirty="0"/>
-          </a:p>
-        </p:txBody>
-      </p:sp>
-      <p:sp>
-        <p:nvSpPr>
-          <p:cNvPr id="5" name="Content Placeholder 4"/>
-          <p:cNvSpPr>
-            <a:spLocks noGrp="1"/>
-          </p:cNvSpPr>
-          <p:nvPr>
-            <p:ph idx="1"/>
-          </p:nvPr>
-        </p:nvSpPr>
-        <p:spPr/>
-        <p:txBody>
-          <a:bodyPr/>
-          <a:lstStyle/>
-          <a:p>
-            <a:r>
-              <a:rPr lang="en-US" dirty="0" smtClean="0"/>
-              <a:t>Probe to Alpha Centauri B Orbit: 105 years</a:t>
-            </a:r>
-          </a:p>
-          <a:p>
-            <a:r>
-              <a:rPr lang="en-US" dirty="0" smtClean="0"/>
-              <a:t>Mandated Power Threshold: 240W</a:t>
-            </a:r>
-          </a:p>
-          <a:p>
-            <a:r>
-              <a:rPr lang="en-US" dirty="0" smtClean="0"/>
-              <a:t>Minimum Pu-238: </a:t>
-            </a:r>
-          </a:p>
-          <a:p>
-            <a:endParaRPr lang="en-US" dirty="0" smtClean="0"/>
           </a:p>
         </p:txBody>
       </p:sp>
@@ -5717,15 +6632,21 @@
           <p:nvPr/>
         </p:nvPicPr>
         <p:blipFill>
-          <a:blip r:embed="rId2"/>
+          <a:blip r:embed="rId4">
+            <a:extLst>
+              <a:ext uri="{28A0092B-C50C-407E-A947-70E740481C1C}">
+                <a14:useLocalDpi xmlns:a14="http://schemas.microsoft.com/office/drawing/2010/main" val="0"/>
+              </a:ext>
+            </a:extLst>
+          </a:blip>
           <a:stretch>
             <a:fillRect/>
           </a:stretch>
         </p:blipFill>
         <p:spPr>
           <a:xfrm>
-            <a:off x="5803935" y="1672281"/>
-            <a:ext cx="6206834" cy="4657418"/>
+            <a:off x="3706385" y="4681766"/>
+            <a:ext cx="4325507" cy="1605844"/>
           </a:xfrm>
           <a:prstGeom prst="rect">
             <a:avLst/>
@@ -5735,7 +6656,7 @@
     </p:spTree>
     <p:extLst>
       <p:ext uri="{BB962C8B-B14F-4D97-AF65-F5344CB8AC3E}">
-        <p14:creationId xmlns:p14="http://schemas.microsoft.com/office/powerpoint/2010/main" val="1991821810"/>
+        <p14:creationId xmlns:p14="http://schemas.microsoft.com/office/powerpoint/2010/main" val="3807853965"/>
       </p:ext>
     </p:extLst>
   </p:cSld>

</xml_diff>

<commit_message>
A few edits to the presentation and design document. Also, renamed.
</commit_message>
<xml_diff>
--- a/On RTG Design.pptx
+++ b/On RTG Design.pptx
@@ -348,7 +348,7 @@
           <a:p>
             <a:fld id="{8A9F8C75-8048-478D-98CB-F1D016728D0F}" type="datetimeFigureOut">
               <a:rPr lang="en-US" smtClean="0"/>
-              <a:t>11/3/2015</a:t>
+              <a:t>11/4/2015</a:t>
             </a:fld>
             <a:endParaRPr lang="en-US"/>
           </a:p>
@@ -556,7 +556,7 @@
           <a:p>
             <a:fld id="{8A9F8C75-8048-478D-98CB-F1D016728D0F}" type="datetimeFigureOut">
               <a:rPr lang="en-US" smtClean="0"/>
-              <a:t>11/3/2015</a:t>
+              <a:t>11/4/2015</a:t>
             </a:fld>
             <a:endParaRPr lang="en-US"/>
           </a:p>
@@ -812,7 +812,7 @@
           <a:p>
             <a:fld id="{8A9F8C75-8048-478D-98CB-F1D016728D0F}" type="datetimeFigureOut">
               <a:rPr lang="en-US" smtClean="0"/>
-              <a:t>11/3/2015</a:t>
+              <a:t>11/4/2015</a:t>
             </a:fld>
             <a:endParaRPr lang="en-US"/>
           </a:p>
@@ -986,7 +986,7 @@
           <a:p>
             <a:fld id="{8A9F8C75-8048-478D-98CB-F1D016728D0F}" type="datetimeFigureOut">
               <a:rPr lang="en-US" smtClean="0"/>
-              <a:t>11/3/2015</a:t>
+              <a:t>11/4/2015</a:t>
             </a:fld>
             <a:endParaRPr lang="en-US"/>
           </a:p>
@@ -1329,7 +1329,7 @@
           <a:p>
             <a:fld id="{8A9F8C75-8048-478D-98CB-F1D016728D0F}" type="datetimeFigureOut">
               <a:rPr lang="en-US" smtClean="0"/>
-              <a:t>11/3/2015</a:t>
+              <a:t>11/4/2015</a:t>
             </a:fld>
             <a:endParaRPr lang="en-US"/>
           </a:p>
@@ -1604,7 +1604,7 @@
           <a:p>
             <a:fld id="{8A9F8C75-8048-478D-98CB-F1D016728D0F}" type="datetimeFigureOut">
               <a:rPr lang="en-US" smtClean="0"/>
-              <a:t>11/3/2015</a:t>
+              <a:t>11/4/2015</a:t>
             </a:fld>
             <a:endParaRPr lang="en-US"/>
           </a:p>
@@ -1983,7 +1983,7 @@
           <a:p>
             <a:fld id="{8A9F8C75-8048-478D-98CB-F1D016728D0F}" type="datetimeFigureOut">
               <a:rPr lang="en-US" smtClean="0"/>
-              <a:t>11/3/2015</a:t>
+              <a:t>11/4/2015</a:t>
             </a:fld>
             <a:endParaRPr lang="en-US"/>
           </a:p>
@@ -2101,7 +2101,7 @@
           <a:p>
             <a:fld id="{8A9F8C75-8048-478D-98CB-F1D016728D0F}" type="datetimeFigureOut">
               <a:rPr lang="en-US" smtClean="0"/>
-              <a:t>11/3/2015</a:t>
+              <a:t>11/4/2015</a:t>
             </a:fld>
             <a:endParaRPr lang="en-US"/>
           </a:p>
@@ -2272,7 +2272,7 @@
           <a:p>
             <a:fld id="{8A9F8C75-8048-478D-98CB-F1D016728D0F}" type="datetimeFigureOut">
               <a:rPr lang="en-US" smtClean="0"/>
-              <a:t>11/3/2015</a:t>
+              <a:t>11/4/2015</a:t>
             </a:fld>
             <a:endParaRPr lang="en-US"/>
           </a:p>
@@ -2626,7 +2626,7 @@
           <a:p>
             <a:fld id="{8A9F8C75-8048-478D-98CB-F1D016728D0F}" type="datetimeFigureOut">
               <a:rPr lang="en-US" smtClean="0"/>
-              <a:t>11/3/2015</a:t>
+              <a:t>11/4/2015</a:t>
             </a:fld>
             <a:endParaRPr lang="en-US"/>
           </a:p>
@@ -3008,7 +3008,7 @@
           <a:p>
             <a:fld id="{8A9F8C75-8048-478D-98CB-F1D016728D0F}" type="datetimeFigureOut">
               <a:rPr lang="en-US" smtClean="0"/>
-              <a:t>11/3/2015</a:t>
+              <a:t>11/4/2015</a:t>
             </a:fld>
             <a:endParaRPr lang="en-US"/>
           </a:p>
@@ -3295,7 +3295,7 @@
           <a:p>
             <a:fld id="{8A9F8C75-8048-478D-98CB-F1D016728D0F}" type="datetimeFigureOut">
               <a:rPr lang="en-US" smtClean="0"/>
-              <a:t>11/3/2015</a:t>
+              <a:t>11/4/2015</a:t>
             </a:fld>
             <a:endParaRPr lang="en-US"/>
           </a:p>
@@ -4083,21 +4083,13 @@
           <a:p>
             <a:r>
               <a:rPr lang="en-US" dirty="0" smtClean="0"/>
-              <a:t>Length of New Horizons Mission: 10 </a:t>
-            </a:r>
+              <a:t>Length of New Horizons Mission: 10 years</a:t>
+            </a:r>
+          </a:p>
+          <a:p>
             <a:r>
               <a:rPr lang="en-US" dirty="0" smtClean="0"/>
-              <a:t>years</a:t>
-            </a:r>
-          </a:p>
-          <a:p>
-            <a:r>
-              <a:rPr lang="en-US" dirty="0" smtClean="0"/>
-              <a:t>Mandated Power Threshold: </a:t>
-            </a:r>
-            <a:r>
-              <a:rPr lang="en-US" dirty="0" smtClean="0"/>
-              <a:t>200W</a:t>
+              <a:t>Mandated Power Threshold: 200W</a:t>
             </a:r>
           </a:p>
           <a:p>
@@ -4231,11 +4223,6 @@
               </a:rPr>
               <a:t>12.8 million dollars</a:t>
             </a:r>
-            <a:endParaRPr lang="en-US" dirty="0" smtClean="0">
-              <a:solidFill>
-                <a:srgbClr val="FF0000"/>
-              </a:solidFill>
-            </a:endParaRPr>
           </a:p>
         </p:txBody>
       </p:sp>
@@ -5191,8 +5178,8 @@
           </a:p>
         </p:txBody>
       </p:sp>
-      <mc:AlternateContent xmlns:mc="http://schemas.openxmlformats.org/markup-compatibility/2006">
-        <mc:Choice xmlns:a14="http://schemas.microsoft.com/office/drawing/2010/main" Requires="a14">
+      <mc:AlternateContent xmlns:mc="http://schemas.openxmlformats.org/markup-compatibility/2006" xmlns:a14="http://schemas.microsoft.com/office/drawing/2010/main">
+        <mc:Choice Requires="a14">
           <p:sp>
             <p:nvSpPr>
               <p:cNvPr id="5" name="Rectangle 4"/>
@@ -5920,7 +5907,7 @@
             </p:txBody>
           </p:sp>
         </mc:Choice>
-        <mc:Fallback>
+        <mc:Fallback xmlns="">
           <p:sp>
             <p:nvSpPr>
               <p:cNvPr id="5" name="Rectangle 4"/>
@@ -5959,8 +5946,8 @@
           </p:sp>
         </mc:Fallback>
       </mc:AlternateContent>
-      <mc:AlternateContent xmlns:mc="http://schemas.openxmlformats.org/markup-compatibility/2006">
-        <mc:Choice xmlns:a14="http://schemas.microsoft.com/office/drawing/2010/main" Requires="a14">
+      <mc:AlternateContent xmlns:mc="http://schemas.openxmlformats.org/markup-compatibility/2006" xmlns:a14="http://schemas.microsoft.com/office/drawing/2010/main">
+        <mc:Choice Requires="a14">
           <p:sp>
             <p:nvSpPr>
               <p:cNvPr id="6" name="Rectangle 5"/>
@@ -6173,7 +6160,7 @@
             </p:txBody>
           </p:sp>
         </mc:Choice>
-        <mc:Fallback>
+        <mc:Fallback xmlns="">
           <p:sp>
             <p:nvSpPr>
               <p:cNvPr id="6" name="Rectangle 5"/>
@@ -6259,11 +6246,7 @@
           <a:p>
             <a:r>
               <a:rPr lang="en-US" dirty="0" smtClean="0"/>
-              <a:t>Our </a:t>
-            </a:r>
-            <a:r>
-              <a:rPr lang="en-US" dirty="0" smtClean="0"/>
-              <a:t>Simulation</a:t>
+              <a:t>Our Simulation</a:t>
             </a:r>
             <a:endParaRPr lang="en-US" dirty="0"/>
           </a:p>
@@ -6653,6 +6636,40 @@
           </a:prstGeom>
         </p:spPr>
       </p:pic>
+      <p:sp>
+        <p:nvSpPr>
+          <p:cNvPr id="4" name="TextBox 3"/>
+          <p:cNvSpPr txBox="1"/>
+          <p:nvPr/>
+        </p:nvSpPr>
+        <p:spPr>
+          <a:xfrm>
+            <a:off x="2603156" y="5161523"/>
+            <a:ext cx="915122" cy="369332"/>
+          </a:xfrm>
+          <a:prstGeom prst="rect">
+            <a:avLst/>
+          </a:prstGeom>
+          <a:noFill/>
+        </p:spPr>
+        <p:txBody>
+          <a:bodyPr wrap="none" rtlCol="0">
+            <a:spAutoFit/>
+          </a:bodyPr>
+          <a:lstStyle/>
+          <a:p>
+            <a:r>
+              <a:rPr lang="en-US" dirty="0" err="1" smtClean="0"/>
+              <a:t>Matlab</a:t>
+            </a:r>
+            <a:r>
+              <a:rPr lang="en-US" dirty="0" smtClean="0"/>
+              <a:t>:</a:t>
+            </a:r>
+            <a:endParaRPr lang="en-US" dirty="0"/>
+          </a:p>
+        </p:txBody>
+      </p:sp>
     </p:spTree>
     <p:extLst>
       <p:ext uri="{BB962C8B-B14F-4D97-AF65-F5344CB8AC3E}">

</xml_diff>

<commit_message>
Final presentation and pdf for submission
</commit_message>
<xml_diff>
--- a/On RTG Design.pptx
+++ b/On RTG Design.pptx
@@ -5045,6 +5045,13 @@
   <p:clrMapOvr>
     <a:masterClrMapping/>
   </p:clrMapOvr>
+  <p:timing>
+    <p:tnLst>
+      <p:par>
+        <p:cTn id="1" dur="indefinite" restart="never" nodeType="tmRoot"/>
+      </p:par>
+    </p:tnLst>
+  </p:timing>
 </p:sld>
 </file>
 
@@ -6209,6 +6216,13 @@
   <p:clrMapOvr>
     <a:masterClrMapping/>
   </p:clrMapOvr>
+  <p:timing>
+    <p:tnLst>
+      <p:par>
+        <p:cTn id="1" dur="indefinite" restart="never" nodeType="tmRoot"/>
+      </p:par>
+    </p:tnLst>
+  </p:timing>
 </p:sld>
 </file>
 

</xml_diff>